<commit_message>
se subio las nuevas clases
</commit_message>
<xml_diff>
--- a/2015-2016/clases/computacion_aplicada_2/clase_6/clase_6.pptx
+++ b/2015-2016/clases/computacion_aplicada_2/clase_6/clase_6.pptx
@@ -13,6 +13,9 @@
     <p:sldId id="260" r:id="rId8"/>
     <p:sldId id="261" r:id="rId9"/>
     <p:sldId id="262" r:id="rId10"/>
+    <p:sldId id="263" r:id="rId11"/>
+    <p:sldId id="264" r:id="rId12"/>
+    <p:sldId id="265" r:id="rId13"/>
   </p:sldIdLst>
   <p:sldSz cx="9144000" cy="6858000"/>
   <p:notesSz cx="7559675" cy="10691812"/>
@@ -70,8 +73,8 @@
         </p:nvSpPr>
         <p:spPr>
           <a:xfrm>
-            <a:off x="457200" y="261000"/>
-            <a:ext cx="8229240" cy="1132560"/>
+            <a:off x="457200" y="273600"/>
+            <a:ext cx="8229240" cy="1145160"/>
           </a:xfrm>
           <a:prstGeom prst="rect">
             <a:avLst/>
@@ -97,7 +100,7 @@
         </p:nvSpPr>
         <p:spPr>
           <a:xfrm>
-            <a:off x="457200" y="1654560"/>
+            <a:off x="457200" y="1604520"/>
             <a:ext cx="8229240" cy="1896840"/>
           </a:xfrm>
           <a:prstGeom prst="rect">
@@ -123,7 +126,7 @@
         </p:nvSpPr>
         <p:spPr>
           <a:xfrm>
-            <a:off x="457200" y="3732120"/>
+            <a:off x="457200" y="3682080"/>
             <a:ext cx="8229240" cy="1896840"/>
           </a:xfrm>
           <a:prstGeom prst="rect">
@@ -171,8 +174,8 @@
         </p:nvSpPr>
         <p:spPr>
           <a:xfrm>
-            <a:off x="457200" y="261000"/>
-            <a:ext cx="8229240" cy="1132560"/>
+            <a:off x="457200" y="273600"/>
+            <a:ext cx="8229240" cy="1145160"/>
           </a:xfrm>
           <a:prstGeom prst="rect">
             <a:avLst/>
@@ -198,7 +201,7 @@
         </p:nvSpPr>
         <p:spPr>
           <a:xfrm>
-            <a:off x="457200" y="1654560"/>
+            <a:off x="457200" y="1604520"/>
             <a:ext cx="4015800" cy="1896840"/>
           </a:xfrm>
           <a:prstGeom prst="rect">
@@ -224,7 +227,7 @@
         </p:nvSpPr>
         <p:spPr>
           <a:xfrm>
-            <a:off x="4674240" y="1654560"/>
+            <a:off x="4674240" y="1604520"/>
             <a:ext cx="4015800" cy="1896840"/>
           </a:xfrm>
           <a:prstGeom prst="rect">
@@ -250,7 +253,7 @@
         </p:nvSpPr>
         <p:spPr>
           <a:xfrm>
-            <a:off x="4674240" y="3732120"/>
+            <a:off x="4674240" y="3682080"/>
             <a:ext cx="4015800" cy="1896840"/>
           </a:xfrm>
           <a:prstGeom prst="rect">
@@ -276,7 +279,7 @@
         </p:nvSpPr>
         <p:spPr>
           <a:xfrm>
-            <a:off x="457200" y="3732120"/>
+            <a:off x="457200" y="3682080"/>
             <a:ext cx="4015800" cy="1896840"/>
           </a:xfrm>
           <a:prstGeom prst="rect">
@@ -324,8 +327,8 @@
         </p:nvSpPr>
         <p:spPr>
           <a:xfrm>
-            <a:off x="457200" y="261000"/>
-            <a:ext cx="8229240" cy="1132560"/>
+            <a:off x="457200" y="273600"/>
+            <a:ext cx="8229240" cy="1145160"/>
           </a:xfrm>
           <a:prstGeom prst="rect">
             <a:avLst/>
@@ -351,8 +354,8 @@
         </p:nvSpPr>
         <p:spPr>
           <a:xfrm>
-            <a:off x="457200" y="1654560"/>
-            <a:ext cx="8229240" cy="3976920"/>
+            <a:off x="457200" y="1604520"/>
+            <a:ext cx="8229240" cy="3977280"/>
           </a:xfrm>
           <a:prstGeom prst="rect">
             <a:avLst/>
@@ -377,8 +380,8 @@
         </p:nvSpPr>
         <p:spPr>
           <a:xfrm>
-            <a:off x="457200" y="1654560"/>
-            <a:ext cx="8229240" cy="3976920"/>
+            <a:off x="457200" y="1604520"/>
+            <a:ext cx="8229240" cy="3977280"/>
           </a:xfrm>
           <a:prstGeom prst="rect">
             <a:avLst/>
@@ -405,8 +408,8 @@
         </p:blipFill>
         <p:spPr>
           <a:xfrm>
-            <a:off x="2079360" y="1654200"/>
-            <a:ext cx="4984200" cy="3976920"/>
+            <a:off x="2079000" y="1604520"/>
+            <a:ext cx="4984920" cy="3977280"/>
           </a:xfrm>
           <a:prstGeom prst="rect">
             <a:avLst/>
@@ -430,8 +433,8 @@
         </p:blipFill>
         <p:spPr>
           <a:xfrm>
-            <a:off x="2079360" y="1654200"/>
-            <a:ext cx="4984200" cy="3976920"/>
+            <a:off x="2079000" y="1604520"/>
+            <a:ext cx="4984920" cy="3977280"/>
           </a:xfrm>
           <a:prstGeom prst="rect">
             <a:avLst/>
@@ -497,8 +500,8 @@
         </p:nvSpPr>
         <p:spPr>
           <a:xfrm>
-            <a:off x="457200" y="261000"/>
-            <a:ext cx="8229240" cy="1132560"/>
+            <a:off x="457200" y="273600"/>
+            <a:ext cx="8229240" cy="1145160"/>
           </a:xfrm>
           <a:prstGeom prst="rect">
             <a:avLst/>
@@ -524,8 +527,8 @@
         </p:nvSpPr>
         <p:spPr>
           <a:xfrm>
-            <a:off x="457200" y="1654560"/>
-            <a:ext cx="8229240" cy="3977280"/>
+            <a:off x="457200" y="1604520"/>
+            <a:ext cx="8229240" cy="3977640"/>
           </a:xfrm>
           <a:prstGeom prst="rect">
             <a:avLst/>
@@ -573,8 +576,8 @@
         </p:nvSpPr>
         <p:spPr>
           <a:xfrm>
-            <a:off x="457200" y="261000"/>
-            <a:ext cx="8229240" cy="1132560"/>
+            <a:off x="457200" y="273600"/>
+            <a:ext cx="8229240" cy="1145160"/>
           </a:xfrm>
           <a:prstGeom prst="rect">
             <a:avLst/>
@@ -600,8 +603,8 @@
         </p:nvSpPr>
         <p:spPr>
           <a:xfrm>
-            <a:off x="457200" y="1654560"/>
-            <a:ext cx="8229240" cy="3976920"/>
+            <a:off x="457200" y="1604520"/>
+            <a:ext cx="8229240" cy="3977280"/>
           </a:xfrm>
           <a:prstGeom prst="rect">
             <a:avLst/>
@@ -648,8 +651,8 @@
         </p:nvSpPr>
         <p:spPr>
           <a:xfrm>
-            <a:off x="457200" y="261000"/>
-            <a:ext cx="8229240" cy="1132560"/>
+            <a:off x="457200" y="273600"/>
+            <a:ext cx="8229240" cy="1145160"/>
           </a:xfrm>
           <a:prstGeom prst="rect">
             <a:avLst/>
@@ -675,8 +678,8 @@
         </p:nvSpPr>
         <p:spPr>
           <a:xfrm>
-            <a:off x="457200" y="1654560"/>
-            <a:ext cx="4015800" cy="3976920"/>
+            <a:off x="457200" y="1604520"/>
+            <a:ext cx="4015800" cy="3977280"/>
           </a:xfrm>
           <a:prstGeom prst="rect">
             <a:avLst/>
@@ -701,8 +704,8 @@
         </p:nvSpPr>
         <p:spPr>
           <a:xfrm>
-            <a:off x="4674240" y="1654560"/>
-            <a:ext cx="4015800" cy="3976920"/>
+            <a:off x="4674240" y="1604520"/>
+            <a:ext cx="4015800" cy="3977280"/>
           </a:xfrm>
           <a:prstGeom prst="rect">
             <a:avLst/>
@@ -749,8 +752,8 @@
         </p:nvSpPr>
         <p:spPr>
           <a:xfrm>
-            <a:off x="457200" y="261000"/>
-            <a:ext cx="8229240" cy="1132560"/>
+            <a:off x="457200" y="273600"/>
+            <a:ext cx="8229240" cy="1145160"/>
           </a:xfrm>
           <a:prstGeom prst="rect">
             <a:avLst/>
@@ -798,8 +801,8 @@
         </p:nvSpPr>
         <p:spPr>
           <a:xfrm>
-            <a:off x="457200" y="261000"/>
-            <a:ext cx="8229240" cy="5249880"/>
+            <a:off x="457200" y="273600"/>
+            <a:ext cx="8229240" cy="5308200"/>
           </a:xfrm>
           <a:prstGeom prst="rect">
             <a:avLst/>
@@ -847,8 +850,8 @@
         </p:nvSpPr>
         <p:spPr>
           <a:xfrm>
-            <a:off x="457200" y="261000"/>
-            <a:ext cx="8229240" cy="1132560"/>
+            <a:off x="457200" y="273600"/>
+            <a:ext cx="8229240" cy="1145160"/>
           </a:xfrm>
           <a:prstGeom prst="rect">
             <a:avLst/>
@@ -874,7 +877,7 @@
         </p:nvSpPr>
         <p:spPr>
           <a:xfrm>
-            <a:off x="457200" y="1654560"/>
+            <a:off x="457200" y="1604520"/>
             <a:ext cx="4015800" cy="1896840"/>
           </a:xfrm>
           <a:prstGeom prst="rect">
@@ -900,7 +903,7 @@
         </p:nvSpPr>
         <p:spPr>
           <a:xfrm>
-            <a:off x="457200" y="3732120"/>
+            <a:off x="457200" y="3682080"/>
             <a:ext cx="4015800" cy="1896840"/>
           </a:xfrm>
           <a:prstGeom prst="rect">
@@ -926,8 +929,8 @@
         </p:nvSpPr>
         <p:spPr>
           <a:xfrm>
-            <a:off x="4674240" y="1654560"/>
-            <a:ext cx="4015800" cy="3976920"/>
+            <a:off x="4674240" y="1604520"/>
+            <a:ext cx="4015800" cy="3977280"/>
           </a:xfrm>
           <a:prstGeom prst="rect">
             <a:avLst/>
@@ -974,8 +977,8 @@
         </p:nvSpPr>
         <p:spPr>
           <a:xfrm>
-            <a:off x="457200" y="261000"/>
-            <a:ext cx="8229240" cy="1132560"/>
+            <a:off x="457200" y="273600"/>
+            <a:ext cx="8229240" cy="1145160"/>
           </a:xfrm>
           <a:prstGeom prst="rect">
             <a:avLst/>
@@ -1001,8 +1004,8 @@
         </p:nvSpPr>
         <p:spPr>
           <a:xfrm>
-            <a:off x="457200" y="1654560"/>
-            <a:ext cx="8229240" cy="3977280"/>
+            <a:off x="457200" y="1604520"/>
+            <a:ext cx="8229240" cy="3977640"/>
           </a:xfrm>
           <a:prstGeom prst="rect">
             <a:avLst/>
@@ -1050,8 +1053,8 @@
         </p:nvSpPr>
         <p:spPr>
           <a:xfrm>
-            <a:off x="457200" y="261000"/>
-            <a:ext cx="8229240" cy="1132560"/>
+            <a:off x="457200" y="273600"/>
+            <a:ext cx="8229240" cy="1145160"/>
           </a:xfrm>
           <a:prstGeom prst="rect">
             <a:avLst/>
@@ -1077,8 +1080,8 @@
         </p:nvSpPr>
         <p:spPr>
           <a:xfrm>
-            <a:off x="457200" y="1654560"/>
-            <a:ext cx="4015800" cy="3976920"/>
+            <a:off x="457200" y="1604520"/>
+            <a:ext cx="4015800" cy="3977280"/>
           </a:xfrm>
           <a:prstGeom prst="rect">
             <a:avLst/>
@@ -1103,7 +1106,7 @@
         </p:nvSpPr>
         <p:spPr>
           <a:xfrm>
-            <a:off x="4674240" y="1654560"/>
+            <a:off x="4674240" y="1604520"/>
             <a:ext cx="4015800" cy="1896840"/>
           </a:xfrm>
           <a:prstGeom prst="rect">
@@ -1129,7 +1132,7 @@
         </p:nvSpPr>
         <p:spPr>
           <a:xfrm>
-            <a:off x="4674240" y="3732120"/>
+            <a:off x="4674240" y="3682080"/>
             <a:ext cx="4015800" cy="1896840"/>
           </a:xfrm>
           <a:prstGeom prst="rect">
@@ -1177,8 +1180,8 @@
         </p:nvSpPr>
         <p:spPr>
           <a:xfrm>
-            <a:off x="457200" y="261000"/>
-            <a:ext cx="8229240" cy="1132560"/>
+            <a:off x="457200" y="273600"/>
+            <a:ext cx="8229240" cy="1145160"/>
           </a:xfrm>
           <a:prstGeom prst="rect">
             <a:avLst/>
@@ -1204,7 +1207,7 @@
         </p:nvSpPr>
         <p:spPr>
           <a:xfrm>
-            <a:off x="457200" y="1654560"/>
+            <a:off x="457200" y="1604520"/>
             <a:ext cx="4015800" cy="1896840"/>
           </a:xfrm>
           <a:prstGeom prst="rect">
@@ -1230,7 +1233,7 @@
         </p:nvSpPr>
         <p:spPr>
           <a:xfrm>
-            <a:off x="4674240" y="1654560"/>
+            <a:off x="4674240" y="1604520"/>
             <a:ext cx="4015800" cy="1896840"/>
           </a:xfrm>
           <a:prstGeom prst="rect">
@@ -1256,7 +1259,7 @@
         </p:nvSpPr>
         <p:spPr>
           <a:xfrm>
-            <a:off x="457200" y="3732120"/>
+            <a:off x="457200" y="3682080"/>
             <a:ext cx="8229240" cy="1896840"/>
           </a:xfrm>
           <a:prstGeom prst="rect">
@@ -1304,8 +1307,8 @@
         </p:nvSpPr>
         <p:spPr>
           <a:xfrm>
-            <a:off x="457200" y="261000"/>
-            <a:ext cx="8229240" cy="1132560"/>
+            <a:off x="457200" y="273600"/>
+            <a:ext cx="8229240" cy="1145160"/>
           </a:xfrm>
           <a:prstGeom prst="rect">
             <a:avLst/>
@@ -1331,7 +1334,7 @@
         </p:nvSpPr>
         <p:spPr>
           <a:xfrm>
-            <a:off x="457200" y="1654560"/>
+            <a:off x="457200" y="1604520"/>
             <a:ext cx="8229240" cy="1896840"/>
           </a:xfrm>
           <a:prstGeom prst="rect">
@@ -1357,7 +1360,7 @@
         </p:nvSpPr>
         <p:spPr>
           <a:xfrm>
-            <a:off x="457200" y="3732120"/>
+            <a:off x="457200" y="3682080"/>
             <a:ext cx="8229240" cy="1896840"/>
           </a:xfrm>
           <a:prstGeom prst="rect">
@@ -1405,8 +1408,8 @@
         </p:nvSpPr>
         <p:spPr>
           <a:xfrm>
-            <a:off x="457200" y="261000"/>
-            <a:ext cx="8229240" cy="1132560"/>
+            <a:off x="457200" y="273600"/>
+            <a:ext cx="8229240" cy="1145160"/>
           </a:xfrm>
           <a:prstGeom prst="rect">
             <a:avLst/>
@@ -1432,7 +1435,7 @@
         </p:nvSpPr>
         <p:spPr>
           <a:xfrm>
-            <a:off x="457200" y="1654560"/>
+            <a:off x="457200" y="1604520"/>
             <a:ext cx="4015800" cy="1896840"/>
           </a:xfrm>
           <a:prstGeom prst="rect">
@@ -1458,7 +1461,7 @@
         </p:nvSpPr>
         <p:spPr>
           <a:xfrm>
-            <a:off x="4674240" y="1654560"/>
+            <a:off x="4674240" y="1604520"/>
             <a:ext cx="4015800" cy="1896840"/>
           </a:xfrm>
           <a:prstGeom prst="rect">
@@ -1484,7 +1487,7 @@
         </p:nvSpPr>
         <p:spPr>
           <a:xfrm>
-            <a:off x="4674240" y="3732120"/>
+            <a:off x="4674240" y="3682080"/>
             <a:ext cx="4015800" cy="1896840"/>
           </a:xfrm>
           <a:prstGeom prst="rect">
@@ -1510,7 +1513,7 @@
         </p:nvSpPr>
         <p:spPr>
           <a:xfrm>
-            <a:off x="457200" y="3732120"/>
+            <a:off x="457200" y="3682080"/>
             <a:ext cx="4015800" cy="1896840"/>
           </a:xfrm>
           <a:prstGeom prst="rect">
@@ -1558,8 +1561,8 @@
         </p:nvSpPr>
         <p:spPr>
           <a:xfrm>
-            <a:off x="457200" y="261000"/>
-            <a:ext cx="8229240" cy="1132560"/>
+            <a:off x="457200" y="273600"/>
+            <a:ext cx="8229240" cy="1145160"/>
           </a:xfrm>
           <a:prstGeom prst="rect">
             <a:avLst/>
@@ -1585,8 +1588,8 @@
         </p:nvSpPr>
         <p:spPr>
           <a:xfrm>
-            <a:off x="457200" y="1654560"/>
-            <a:ext cx="8229240" cy="3976920"/>
+            <a:off x="457200" y="1604520"/>
+            <a:ext cx="8229240" cy="3977280"/>
           </a:xfrm>
           <a:prstGeom prst="rect">
             <a:avLst/>
@@ -1611,8 +1614,8 @@
         </p:nvSpPr>
         <p:spPr>
           <a:xfrm>
-            <a:off x="457200" y="1654560"/>
-            <a:ext cx="8229240" cy="3976920"/>
+            <a:off x="457200" y="1604520"/>
+            <a:ext cx="8229240" cy="3977280"/>
           </a:xfrm>
           <a:prstGeom prst="rect">
             <a:avLst/>
@@ -1639,8 +1642,8 @@
         </p:blipFill>
         <p:spPr>
           <a:xfrm>
-            <a:off x="2079360" y="1654200"/>
-            <a:ext cx="4984200" cy="3976920"/>
+            <a:off x="2079000" y="1604520"/>
+            <a:ext cx="4984920" cy="3977280"/>
           </a:xfrm>
           <a:prstGeom prst="rect">
             <a:avLst/>
@@ -1664,8 +1667,8 @@
         </p:blipFill>
         <p:spPr>
           <a:xfrm>
-            <a:off x="2079360" y="1654200"/>
-            <a:ext cx="4984200" cy="3976920"/>
+            <a:off x="2079000" y="1604520"/>
+            <a:ext cx="4984920" cy="3977280"/>
           </a:xfrm>
           <a:prstGeom prst="rect">
             <a:avLst/>
@@ -1709,8 +1712,8 @@
         </p:nvSpPr>
         <p:spPr>
           <a:xfrm>
-            <a:off x="457200" y="261000"/>
-            <a:ext cx="8229240" cy="1132560"/>
+            <a:off x="457200" y="273600"/>
+            <a:ext cx="8229240" cy="1145160"/>
           </a:xfrm>
           <a:prstGeom prst="rect">
             <a:avLst/>
@@ -1736,8 +1739,8 @@
         </p:nvSpPr>
         <p:spPr>
           <a:xfrm>
-            <a:off x="457200" y="1654560"/>
-            <a:ext cx="8229240" cy="3976920"/>
+            <a:off x="457200" y="1604520"/>
+            <a:ext cx="8229240" cy="3977280"/>
           </a:xfrm>
           <a:prstGeom prst="rect">
             <a:avLst/>
@@ -1784,8 +1787,8 @@
         </p:nvSpPr>
         <p:spPr>
           <a:xfrm>
-            <a:off x="457200" y="261000"/>
-            <a:ext cx="8229240" cy="1132560"/>
+            <a:off x="457200" y="273600"/>
+            <a:ext cx="8229240" cy="1145160"/>
           </a:xfrm>
           <a:prstGeom prst="rect">
             <a:avLst/>
@@ -1811,8 +1814,8 @@
         </p:nvSpPr>
         <p:spPr>
           <a:xfrm>
-            <a:off x="457200" y="1654560"/>
-            <a:ext cx="4015800" cy="3976920"/>
+            <a:off x="457200" y="1604520"/>
+            <a:ext cx="4015800" cy="3977280"/>
           </a:xfrm>
           <a:prstGeom prst="rect">
             <a:avLst/>
@@ -1837,8 +1840,8 @@
         </p:nvSpPr>
         <p:spPr>
           <a:xfrm>
-            <a:off x="4674240" y="1654560"/>
-            <a:ext cx="4015800" cy="3976920"/>
+            <a:off x="4674240" y="1604520"/>
+            <a:ext cx="4015800" cy="3977280"/>
           </a:xfrm>
           <a:prstGeom prst="rect">
             <a:avLst/>
@@ -1885,8 +1888,8 @@
         </p:nvSpPr>
         <p:spPr>
           <a:xfrm>
-            <a:off x="457200" y="261000"/>
-            <a:ext cx="8229240" cy="1132560"/>
+            <a:off x="457200" y="273600"/>
+            <a:ext cx="8229240" cy="1145160"/>
           </a:xfrm>
           <a:prstGeom prst="rect">
             <a:avLst/>
@@ -1934,8 +1937,8 @@
         </p:nvSpPr>
         <p:spPr>
           <a:xfrm>
-            <a:off x="457200" y="261000"/>
-            <a:ext cx="8229240" cy="5249880"/>
+            <a:off x="457200" y="273600"/>
+            <a:ext cx="8229240" cy="5308200"/>
           </a:xfrm>
           <a:prstGeom prst="rect">
             <a:avLst/>
@@ -1983,8 +1986,8 @@
         </p:nvSpPr>
         <p:spPr>
           <a:xfrm>
-            <a:off x="457200" y="261000"/>
-            <a:ext cx="8229240" cy="1132560"/>
+            <a:off x="457200" y="273600"/>
+            <a:ext cx="8229240" cy="1145160"/>
           </a:xfrm>
           <a:prstGeom prst="rect">
             <a:avLst/>
@@ -2010,7 +2013,7 @@
         </p:nvSpPr>
         <p:spPr>
           <a:xfrm>
-            <a:off x="457200" y="1654560"/>
+            <a:off x="457200" y="1604520"/>
             <a:ext cx="4015800" cy="1896840"/>
           </a:xfrm>
           <a:prstGeom prst="rect">
@@ -2036,7 +2039,7 @@
         </p:nvSpPr>
         <p:spPr>
           <a:xfrm>
-            <a:off x="457200" y="3732120"/>
+            <a:off x="457200" y="3682080"/>
             <a:ext cx="4015800" cy="1896840"/>
           </a:xfrm>
           <a:prstGeom prst="rect">
@@ -2062,8 +2065,8 @@
         </p:nvSpPr>
         <p:spPr>
           <a:xfrm>
-            <a:off x="4674240" y="1654560"/>
-            <a:ext cx="4015800" cy="3976920"/>
+            <a:off x="4674240" y="1604520"/>
+            <a:ext cx="4015800" cy="3977280"/>
           </a:xfrm>
           <a:prstGeom prst="rect">
             <a:avLst/>
@@ -2110,8 +2113,8 @@
         </p:nvSpPr>
         <p:spPr>
           <a:xfrm>
-            <a:off x="457200" y="261000"/>
-            <a:ext cx="8229240" cy="1132560"/>
+            <a:off x="457200" y="273600"/>
+            <a:ext cx="8229240" cy="1145160"/>
           </a:xfrm>
           <a:prstGeom prst="rect">
             <a:avLst/>
@@ -2137,8 +2140,8 @@
         </p:nvSpPr>
         <p:spPr>
           <a:xfrm>
-            <a:off x="457200" y="1654560"/>
-            <a:ext cx="4015800" cy="3976920"/>
+            <a:off x="457200" y="1604520"/>
+            <a:ext cx="4015800" cy="3977280"/>
           </a:xfrm>
           <a:prstGeom prst="rect">
             <a:avLst/>
@@ -2163,7 +2166,7 @@
         </p:nvSpPr>
         <p:spPr>
           <a:xfrm>
-            <a:off x="4674240" y="1654560"/>
+            <a:off x="4674240" y="1604520"/>
             <a:ext cx="4015800" cy="1896840"/>
           </a:xfrm>
           <a:prstGeom prst="rect">
@@ -2189,7 +2192,7 @@
         </p:nvSpPr>
         <p:spPr>
           <a:xfrm>
-            <a:off x="4674240" y="3732120"/>
+            <a:off x="4674240" y="3682080"/>
             <a:ext cx="4015800" cy="1896840"/>
           </a:xfrm>
           <a:prstGeom prst="rect">
@@ -2237,8 +2240,8 @@
         </p:nvSpPr>
         <p:spPr>
           <a:xfrm>
-            <a:off x="457200" y="261000"/>
-            <a:ext cx="8229240" cy="1132560"/>
+            <a:off x="457200" y="273600"/>
+            <a:ext cx="8229240" cy="1145160"/>
           </a:xfrm>
           <a:prstGeom prst="rect">
             <a:avLst/>
@@ -2264,7 +2267,7 @@
         </p:nvSpPr>
         <p:spPr>
           <a:xfrm>
-            <a:off x="457200" y="1654560"/>
+            <a:off x="457200" y="1604520"/>
             <a:ext cx="4015800" cy="1896840"/>
           </a:xfrm>
           <a:prstGeom prst="rect">
@@ -2290,7 +2293,7 @@
         </p:nvSpPr>
         <p:spPr>
           <a:xfrm>
-            <a:off x="4674240" y="1654560"/>
+            <a:off x="4674240" y="1604520"/>
             <a:ext cx="4015800" cy="1896840"/>
           </a:xfrm>
           <a:prstGeom prst="rect">
@@ -2316,7 +2319,7 @@
         </p:nvSpPr>
         <p:spPr>
           <a:xfrm>
-            <a:off x="457200" y="3732120"/>
+            <a:off x="457200" y="3682080"/>
             <a:ext cx="8229240" cy="1896840"/>
           </a:xfrm>
           <a:prstGeom prst="rect">
@@ -2367,7 +2370,7 @@
         <p:spPr>
           <a:xfrm>
             <a:off x="720" y="1080"/>
-            <a:ext cx="9141480" cy="6859800"/>
+            <a:ext cx="9140760" cy="6859080"/>
           </a:xfrm>
           <a:prstGeom prst="rect">
             <a:avLst/>
@@ -2389,8 +2392,8 @@
         </p:nvSpPr>
         <p:spPr>
           <a:xfrm>
-            <a:off x="457200" y="261000"/>
-            <a:ext cx="8229240" cy="1132200"/>
+            <a:off x="457200" y="273600"/>
+            <a:ext cx="8229240" cy="1144800"/>
           </a:xfrm>
           <a:prstGeom prst="rect">
             <a:avLst/>
@@ -2399,8 +2402,9 @@
         <p:txBody>
           <a:bodyPr lIns="0" rIns="0" tIns="0" bIns="0" anchor="ctr"/>
           <a:p>
-            <a:r>
-              <a:rPr lang="es-EC">
+            <a:pPr algn="ctr"/>
+            <a:r>
+              <a:rPr lang="es-EC" sz="4400">
                 <a:latin typeface="Arial"/>
               </a:rPr>
               <a:t>Pulse para editar el formato del texto de título</a:t>
@@ -2421,8 +2425,8 @@
         </p:nvSpPr>
         <p:spPr>
           <a:xfrm>
-            <a:off x="457200" y="1654560"/>
-            <a:ext cx="8229240" cy="3976920"/>
+            <a:off x="457200" y="1604520"/>
+            <a:ext cx="8229240" cy="3977280"/>
           </a:xfrm>
           <a:prstGeom prst="rect">
             <a:avLst/>
@@ -2437,7 +2441,7 @@
               <a:buChar char=""/>
             </a:pPr>
             <a:r>
-              <a:rPr lang="es-EC">
+              <a:rPr lang="es-EC" sz="3200">
                 <a:latin typeface="Arial"/>
               </a:rPr>
               <a:t>Pulse para editar el formato de esquema del texto</a:t>
@@ -2451,7 +2455,7 @@
               <a:buChar char=""/>
             </a:pPr>
             <a:r>
-              <a:rPr lang="es-EC">
+              <a:rPr lang="es-EC" sz="2800">
                 <a:latin typeface="Arial"/>
               </a:rPr>
               <a:t>Segundo nivel del esquema</a:t>
@@ -2465,7 +2469,7 @@
               <a:buChar char=""/>
             </a:pPr>
             <a:r>
-              <a:rPr lang="es-EC">
+              <a:rPr lang="es-EC" sz="2400">
                 <a:latin typeface="Arial"/>
               </a:rPr>
               <a:t>Tercer nivel del esquema</a:t>
@@ -2479,7 +2483,7 @@
               <a:buChar char=""/>
             </a:pPr>
             <a:r>
-              <a:rPr lang="es-EC">
+              <a:rPr lang="es-EC" sz="2000">
                 <a:latin typeface="Arial"/>
               </a:rPr>
               <a:t>Cuarto nivel del esquema</a:t>
@@ -2493,7 +2497,7 @@
               <a:buChar char=""/>
             </a:pPr>
             <a:r>
-              <a:rPr lang="es-EC">
+              <a:rPr lang="es-EC" sz="2000">
                 <a:latin typeface="Arial"/>
               </a:rPr>
               <a:t>Quinto nivel del esquema</a:t>
@@ -2507,7 +2511,7 @@
               <a:buChar char=""/>
             </a:pPr>
             <a:r>
-              <a:rPr lang="es-EC">
+              <a:rPr lang="es-EC" sz="2000">
                 <a:latin typeface="Arial"/>
               </a:rPr>
               <a:t>Sexto nivel del esquema</a:t>
@@ -2521,7 +2525,7 @@
               <a:buChar char=""/>
             </a:pPr>
             <a:r>
-              <a:rPr lang="es-EC">
+              <a:rPr lang="es-EC" sz="2000">
                 <a:latin typeface="Arial"/>
               </a:rPr>
               <a:t>Séptimo nivel del esquema</a:t>
@@ -2582,7 +2586,7 @@
         <p:spPr>
           <a:xfrm>
             <a:off x="720" y="1080"/>
-            <a:ext cx="9141480" cy="6859800"/>
+            <a:ext cx="9140760" cy="6859080"/>
           </a:xfrm>
           <a:prstGeom prst="rect">
             <a:avLst/>
@@ -2792,7 +2796,7 @@
         <p:spPr>
           <a:xfrm>
             <a:off x="762120" y="2514600"/>
-            <a:ext cx="7771320" cy="1468800"/>
+            <a:ext cx="7770600" cy="1468080"/>
           </a:xfrm>
           <a:prstGeom prst="rect">
             <a:avLst/>
@@ -2832,6 +2836,153 @@
           <p:childTnLst>
             <p:seq>
               <p:cTn id="2" nodeType="mainSeq"/>
+              <p:prevCondLst>
+                <p:cond delay="0" evt="onPrev">
+                  <p:tgtEl>
+                    <p:sldTgt/>
+                  </p:tgtEl>
+                </p:cond>
+              </p:prevCondLst>
+              <p:nextCondLst>
+                <p:cond delay="0" evt="onNext">
+                  <p:tgtEl>
+                    <p:sldTgt/>
+                  </p:tgtEl>
+                </p:cond>
+              </p:nextCondLst>
+            </p:seq>
+          </p:childTnLst>
+        </p:cTn>
+      </p:par>
+    </p:tnLst>
+  </p:timing>
+</p:sld>
+</file>
+
+<file path=ppt/slides/slide10.xml><?xml version="1.0" encoding="utf-8"?>
+<p:sld xmlns:a="http://schemas.openxmlformats.org/drawingml/2006/main" xmlns:p="http://schemas.openxmlformats.org/presentationml/2006/main" xmlns:r="http://schemas.openxmlformats.org/officeDocument/2006/relationships">
+  <p:cSld>
+    <p:spTree>
+      <p:nvGrpSpPr>
+        <p:cNvPr id="1" name=""/>
+        <p:cNvGrpSpPr/>
+        <p:nvPr/>
+      </p:nvGrpSpPr>
+      <p:grpSpPr>
+        <a:xfrm>
+          <a:off x="0" y="0"/>
+          <a:ext cx="0" cy="0"/>
+          <a:chOff x="0" y="0"/>
+          <a:chExt cx="0" cy="0"/>
+        </a:xfrm>
+      </p:grpSpPr>
+      <p:sp>
+        <p:nvSpPr>
+          <p:cNvPr id="84" name="CustomShape 1"/>
+          <p:cNvSpPr/>
+          <p:nvPr/>
+        </p:nvSpPr>
+        <p:spPr>
+          <a:xfrm>
+            <a:off x="360000" y="432000"/>
+            <a:ext cx="8351640" cy="5441400"/>
+          </a:xfrm>
+          <a:prstGeom prst="rect">
+            <a:avLst/>
+          </a:prstGeom>
+          <a:noFill/>
+          <a:ln>
+            <a:noFill/>
+          </a:ln>
+        </p:spPr>
+        <p:txBody>
+          <a:bodyPr lIns="90000" rIns="90000" tIns="45000" bIns="45000"/>
+          <a:p>
+            <a:r>
+              <a:rPr b="1" lang="es-EC" sz="2400">
+                <a:latin typeface="Colibri"/>
+              </a:rPr>
+              <a:t>VA:</a:t>
+            </a:r>
+            <a:r>
+              <a:rPr lang="es-EC" sz="2400">
+                <a:latin typeface="Colibri"/>
+              </a:rPr>
+              <a:t> Devuelve el valor presente de una inversión: la suma total del valor actual de una serie de pagos futuros.</a:t>
+            </a:r>
+            <a:endParaRPr/>
+          </a:p>
+          <a:p>
+            <a:r>
+              <a:rPr b="1" lang="es-EC" sz="2400">
+                <a:latin typeface="Colibri"/>
+              </a:rPr>
+              <a:t>VF:</a:t>
+            </a:r>
+            <a:r>
+              <a:rPr lang="es-EC" sz="2400">
+                <a:latin typeface="Colibri"/>
+              </a:rPr>
+              <a:t> Devuelve el valor futuro de una inversión basado en Pagos periódicos y constantes, y una tasa de interés también constante.</a:t>
+            </a:r>
+            <a:endParaRPr/>
+          </a:p>
+          <a:p>
+            <a:r>
+              <a:rPr b="1" lang="es-EC" sz="2400">
+                <a:latin typeface="Colibri"/>
+              </a:rPr>
+              <a:t>VF.PLAN:</a:t>
+            </a:r>
+            <a:r>
+              <a:rPr lang="es-EC" sz="2400">
+                <a:latin typeface="Colibri"/>
+              </a:rPr>
+              <a:t> Devuelve el valor futuro de una inversión inicial después de aplicar una serie de tasas de interés compuesto. </a:t>
+            </a:r>
+            <a:endParaRPr/>
+          </a:p>
+          <a:p>
+            <a:r>
+              <a:rPr b="1" lang="es-EC" sz="2400">
+                <a:latin typeface="Colibri"/>
+              </a:rPr>
+              <a:t>VNA:</a:t>
+            </a:r>
+            <a:r>
+              <a:rPr lang="es-EC" sz="2400">
+                <a:latin typeface="Colibri"/>
+              </a:rPr>
+              <a:t> Devuelve el valor neto actual de una inversión  partir de una tasa de descuento y una serie de pagos futuros (valores negativos) y Entradas (valores positivos).</a:t>
+            </a:r>
+            <a:endParaRPr/>
+          </a:p>
+          <a:p>
+            <a:r>
+              <a:rPr b="1" lang="es-EC" sz="2400">
+                <a:latin typeface="Colibri"/>
+              </a:rPr>
+              <a:t>VNA.NO.PER:</a:t>
+            </a:r>
+            <a:r>
+              <a:rPr lang="es-EC" sz="2400">
+                <a:latin typeface="Colibri"/>
+              </a:rPr>
+              <a:t> Devuelve el valor neto actual para un flujo de caja que no es Necesariamente periódico.</a:t>
+            </a:r>
+            <a:endParaRPr/>
+          </a:p>
+        </p:txBody>
+      </p:sp>
+    </p:spTree>
+  </p:cSld>
+  <p:timing>
+    <p:tnLst>
+      <p:par>
+        <p:cTn id="17" dur="indefinite" restart="never" nodeType="tmRoot">
+          <p:childTnLst>
+            <p:seq>
+              <p:cTn id="18" nodeType="mainSeq"/>
               <p:prevCondLst>
                 <p:cond delay="0" evt="onPrev">
                   <p:tgtEl>
@@ -2874,18 +3025,22 @@
       </p:grpSpPr>
       <p:sp>
         <p:nvSpPr>
-          <p:cNvPr id="75" name="TextShape 1"/>
-          <p:cNvSpPr txBox="1"/>
+          <p:cNvPr id="75" name="CustomShape 1"/>
+          <p:cNvSpPr/>
           <p:nvPr/>
         </p:nvSpPr>
         <p:spPr>
           <a:xfrm>
-            <a:off x="432000" y="360000"/>
-            <a:ext cx="8280000" cy="6155280"/>
-          </a:xfrm>
-          <a:prstGeom prst="rect">
-            <a:avLst/>
-          </a:prstGeom>
+            <a:off x="396000" y="360000"/>
+            <a:ext cx="8279280" cy="6154560"/>
+          </a:xfrm>
+          <a:prstGeom prst="rect">
+            <a:avLst/>
+          </a:prstGeom>
+          <a:noFill/>
+          <a:ln>
+            <a:noFill/>
+          </a:ln>
         </p:spPr>
         <p:txBody>
           <a:bodyPr lIns="90000" rIns="90000" tIns="45000" bIns="45000"/>
@@ -2894,28 +3049,40 @@
               <a:rPr b="1" lang="es-EC" sz="2400">
                 <a:latin typeface="Colibri"/>
               </a:rPr>
-              <a:t>AMORTIZ.LIN:</a:t>
-            </a:r>
-            <a:r>
-              <a:rPr lang="es-EC" sz="2400">
-                <a:latin typeface="Colibri"/>
-              </a:rPr>
-              <a:t> Devuelve la amortización de cada uno de los Períodos contables.</a:t>
-            </a:r>
-            <a:endParaRPr/>
-          </a:p>
-          <a:p>
+              <a:t>A</a:t>
+            </a:r>
             <a:r>
               <a:rPr b="1" lang="es-EC" sz="2400">
                 <a:latin typeface="Colibri"/>
               </a:rPr>
+              <a:t>MORTIZ.LIN</a:t>
+            </a:r>
+            <a:r>
+              <a:rPr b="1" lang="es-EC" sz="2000">
+                <a:latin typeface="Colibri"/>
+              </a:rPr>
+              <a:t>: </a:t>
+            </a:r>
+            <a:r>
+              <a:rPr lang="es-EC" sz="2000">
+                <a:latin typeface="Colibri"/>
+              </a:rPr>
+              <a:t>Devuelve la amortización de cada uno de los Períodos contables.</a:t>
+            </a:r>
+            <a:endParaRPr/>
+          </a:p>
+          <a:p>
+            <a:r>
+              <a:rPr b="1" lang="es-EC" sz="2400">
+                <a:latin typeface="Colibri"/>
+              </a:rPr>
               <a:t>AMORTIZ.PROGRE:</a:t>
             </a:r>
             <a:r>
               <a:rPr lang="es-EC" sz="2400">
                 <a:latin typeface="Colibri"/>
               </a:rPr>
-              <a:t> Devuelve la amortización de cada período Contable mediante el uso de un coeficiente de amortización.</a:t>
+              <a:t> Devuelve la amortización progresiva de cada período Contable.</a:t>
             </a:r>
             <a:endParaRPr/>
           </a:p>
@@ -2930,7 +3097,7 @@
               <a:rPr lang="es-EC" sz="2400">
                 <a:latin typeface="Colibri"/>
               </a:rPr>
-              <a:t> Devuelve el número de días en el período nominal que contiene la fecha de liquidación.</a:t>
+              <a:t> Devuelve el número de días en el período nominal(entre 2 cupones) que contiene la fecha de liquidación.</a:t>
             </a:r>
             <a:endParaRPr/>
           </a:p>
@@ -2976,6 +3143,21 @@
                 <a:latin typeface="Colibri"/>
               </a:rPr>
               <a:t> Devuelve fecha de cupón anterior antes de la fecha de liquidación.</a:t>
+            </a:r>
+            <a:endParaRPr/>
+          </a:p>
+          <a:p>
+            <a:r>
+              <a:rPr b="1" lang="es-EC" sz="2400">
+                <a:latin typeface="Colibri"/>
+              </a:rPr>
+              <a:t>CUPON.FECHA.L2: </a:t>
+            </a:r>
+            <a:r>
+              <a:rPr lang="es-EC" sz="2400">
+                <a:latin typeface="Colibri"/>
+              </a:rPr>
+              <a:t>Devuelve la próxima fecha Nominal después de la fecha de liquidación.</a:t>
             </a:r>
             <a:endParaRPr/>
           </a:p>
@@ -3035,34 +3217,26 @@
       </p:grpSpPr>
       <p:sp>
         <p:nvSpPr>
-          <p:cNvPr id="76" name="TextShape 1"/>
-          <p:cNvSpPr txBox="1"/>
+          <p:cNvPr id="76" name="CustomShape 1"/>
+          <p:cNvSpPr/>
           <p:nvPr/>
         </p:nvSpPr>
         <p:spPr>
           <a:xfrm>
             <a:off x="360000" y="576000"/>
-            <a:ext cx="8424000" cy="5798520"/>
-          </a:xfrm>
-          <a:prstGeom prst="rect">
-            <a:avLst/>
-          </a:prstGeom>
+            <a:ext cx="8423280" cy="5797800"/>
+          </a:xfrm>
+          <a:prstGeom prst="rect">
+            <a:avLst/>
+          </a:prstGeom>
+          <a:noFill/>
+          <a:ln>
+            <a:noFill/>
+          </a:ln>
         </p:spPr>
         <p:txBody>
           <a:bodyPr lIns="90000" rIns="90000" tIns="45000" bIns="45000"/>
           <a:p>
-            <a:r>
-              <a:rPr b="1" lang="es-EC" sz="2400">
-                <a:latin typeface="Colibri"/>
-              </a:rPr>
-              <a:t>CUPON.FECHA.L2:</a:t>
-            </a:r>
-            <a:r>
-              <a:rPr lang="es-EC" sz="2400">
-                <a:latin typeface="Colibri"/>
-              </a:rPr>
-              <a:t> Devuelve la próxima fecha Nominal después de la fecha de liquidación.</a:t>
-            </a:r>
             <a:endParaRPr/>
           </a:p>
           <a:p>
@@ -3184,18 +3358,22 @@
       </p:grpSpPr>
       <p:sp>
         <p:nvSpPr>
-          <p:cNvPr id="77" name="TextShape 1"/>
-          <p:cNvSpPr txBox="1"/>
+          <p:cNvPr id="77" name="CustomShape 1"/>
+          <p:cNvSpPr/>
           <p:nvPr/>
         </p:nvSpPr>
         <p:spPr>
           <a:xfrm>
-            <a:off x="360000" y="360000"/>
-            <a:ext cx="8496000" cy="5798520"/>
-          </a:xfrm>
-          <a:prstGeom prst="rect">
-            <a:avLst/>
-          </a:prstGeom>
+            <a:off x="360000" y="288000"/>
+            <a:ext cx="8495280" cy="5797800"/>
+          </a:xfrm>
+          <a:prstGeom prst="rect">
+            <a:avLst/>
+          </a:prstGeom>
+          <a:noFill/>
+          <a:ln>
+            <a:noFill/>
+          </a:ln>
         </p:spPr>
         <p:txBody>
           <a:bodyPr lIns="90000" rIns="90000" tIns="45000" bIns="45000"/>
@@ -3351,8 +3529,8 @@
         </p:nvSpPr>
         <p:spPr>
           <a:xfrm>
-            <a:off x="432000" y="720000"/>
-            <a:ext cx="8280000" cy="5441760"/>
+            <a:off x="288000" y="936000"/>
+            <a:ext cx="8568000" cy="5236560"/>
           </a:xfrm>
           <a:prstGeom prst="rect">
             <a:avLst/>
@@ -3362,113 +3540,54 @@
           <a:bodyPr lIns="90000" rIns="90000" tIns="45000" bIns="45000"/>
           <a:p>
             <a:r>
-              <a:rPr b="1" lang="es-EC" sz="2400">
-                <a:latin typeface="Colibri"/>
-              </a:rPr>
-              <a:t>LETRA.DE.TES.RENDTO:</a:t>
-            </a:r>
-            <a:r>
-              <a:rPr lang="es-EC" sz="2400">
-                <a:latin typeface="Colibri"/>
-              </a:rPr>
-              <a:t> Devuelve el rendimiento de una letra de tesorería.</a:t>
-            </a:r>
-            <a:endParaRPr/>
-          </a:p>
-          <a:p>
-            <a:r>
-              <a:rPr b="1" lang="es-EC" sz="2400">
-                <a:latin typeface="Colibri"/>
-              </a:rPr>
-              <a:t>LETRA.DE.TEST.EQV.A.BONO:</a:t>
-            </a:r>
-            <a:r>
-              <a:rPr lang="es-EC" sz="2400">
-                <a:latin typeface="Colibri"/>
-              </a:rPr>
-              <a:t> Devuelve el Rendimiento para un bono equivalente a una letra de tesorería.</a:t>
-            </a:r>
-            <a:endParaRPr/>
-          </a:p>
-          <a:p>
-            <a:r>
-              <a:rPr b="1" lang="es-EC" sz="2400">
-                <a:latin typeface="Colibri"/>
-              </a:rPr>
-              <a:t>MONEDA.DEC:</a:t>
-            </a:r>
-            <a:r>
-              <a:rPr lang="es-EC" sz="2400">
-                <a:latin typeface="Colibri"/>
-              </a:rPr>
-              <a:t> Convierte un precio en dólar, Expresado como fracción, en un precio en Dólares, Expresado como número decimal. </a:t>
-            </a:r>
-            <a:endParaRPr/>
-          </a:p>
-          <a:p>
-            <a:r>
-              <a:rPr b="1" lang="es-EC" sz="2400">
-                <a:latin typeface="Colibri"/>
-              </a:rPr>
-              <a:t>MONEDA.FRAC:</a:t>
-            </a:r>
-            <a:r>
-              <a:rPr lang="es-EC" sz="2400">
-                <a:latin typeface="Colibri"/>
-              </a:rPr>
-              <a:t> Convierte un precio en dólar, Expresado como número decimal, en un precio en dólares, Expresado como una fracción.</a:t>
-            </a:r>
-            <a:endParaRPr/>
-          </a:p>
-          <a:p>
-            <a:r>
-              <a:rPr b="1" lang="es-EC" sz="2400">
-                <a:latin typeface="Colibri"/>
-              </a:rPr>
-              <a:t>NPER:</a:t>
-            </a:r>
-            <a:r>
-              <a:rPr lang="es-EC" sz="2400">
-                <a:latin typeface="Colibri"/>
-              </a:rPr>
-              <a:t> Devuelve el número de pagos de una Inversión, basado en Pagos constantes y periódicos y una tasa de Interés constante.</a:t>
-            </a:r>
-            <a:endParaRPr/>
-          </a:p>
-          <a:p>
+              <a:rPr lang="es-EC" sz="2400">
+                <a:latin typeface="Arial"/>
+              </a:rPr>
+              <a:t>Por lo general, en todos los casos vas a encontrar la Tasa Nominal Anual (TNA), es decir, el porcentaje que hay que aplicar sobre el monto que pedís en préstamo para determinar cuánto deberás pagar al añoen concepto de intereses si la devolución se hace toda junta. Por ejemplo, $10.000 a una TNA de 18%, implican $1.800 de intereses a pagar al devolver el dinero en un año.</a:t>
+            </a:r>
+            <a:endParaRPr/>
+          </a:p>
+          <a:p>
+            <a:r>
+              <a:rPr lang="es-EC" sz="2400">
+                <a:latin typeface="Arial"/>
+              </a:rPr>
+              <a:t>Ahora bien, en general, los préstamos no se devuelven al año completo sino que se van repagando en cuotas mensuales. Así, el monto adeudado disminuye gradualmente aunque se recarga con intereses sobre el total, que se van capitalizando también cada 30 días, por lo que el impacto financiero de la tasa es mayor. En estos casos, las tasas nominales no resultan las más adecuadas. Así surgen las llamadas "tasas efectivas", que contemplan estas variaciones.</a:t>
+            </a:r>
+            <a:endParaRPr/>
+          </a:p>
+        </p:txBody>
+      </p:sp>
+      <p:sp>
+        <p:nvSpPr>
+          <p:cNvPr id="79" name="TextShape 2"/>
+          <p:cNvSpPr txBox="1"/>
+          <p:nvPr/>
+        </p:nvSpPr>
+        <p:spPr>
+          <a:xfrm>
+            <a:off x="216000" y="72000"/>
+            <a:ext cx="7560000" cy="488160"/>
+          </a:xfrm>
+          <a:prstGeom prst="rect">
+            <a:avLst/>
+          </a:prstGeom>
+        </p:spPr>
+        <p:txBody>
+          <a:bodyPr lIns="90000" rIns="90000" tIns="45000" bIns="45000"/>
+          <a:p>
+            <a:r>
+              <a:rPr lang="es-EC" sz="2800">
+                <a:latin typeface="Arial"/>
+              </a:rPr>
+              <a:t>Diferencia Tasa Interes Nominal y Efectiva</a:t>
+            </a:r>
             <a:endParaRPr/>
           </a:p>
         </p:txBody>
       </p:sp>
     </p:spTree>
   </p:cSld>
-  <p:timing>
-    <p:tnLst>
-      <p:par>
-        <p:cTn id="9" dur="indefinite" restart="never" nodeType="tmRoot">
-          <p:childTnLst>
-            <p:seq>
-              <p:cTn id="10" nodeType="mainSeq"/>
-              <p:prevCondLst>
-                <p:cond delay="0" evt="onPrev">
-                  <p:tgtEl>
-                    <p:sldTgt/>
-                  </p:tgtEl>
-                </p:cond>
-              </p:prevCondLst>
-              <p:nextCondLst>
-                <p:cond delay="0" evt="onNext">
-                  <p:tgtEl>
-                    <p:sldTgt/>
-                  </p:tgtEl>
-                </p:cond>
-              </p:nextCondLst>
-            </p:seq>
-          </p:childTnLst>
-        </p:cTn>
-      </p:par>
-    </p:tnLst>
-  </p:timing>
 </p:sld>
 </file>
 
@@ -3491,18 +3610,22 @@
       </p:grpSpPr>
       <p:sp>
         <p:nvSpPr>
-          <p:cNvPr id="79" name="TextShape 1"/>
-          <p:cNvSpPr txBox="1"/>
+          <p:cNvPr id="80" name="CustomShape 1"/>
+          <p:cNvSpPr/>
           <p:nvPr/>
         </p:nvSpPr>
         <p:spPr>
           <a:xfrm>
-            <a:off x="360000" y="360000"/>
-            <a:ext cx="8352000" cy="6155280"/>
-          </a:xfrm>
-          <a:prstGeom prst="rect">
-            <a:avLst/>
-          </a:prstGeom>
+            <a:off x="432000" y="720000"/>
+            <a:ext cx="8279280" cy="5441040"/>
+          </a:xfrm>
+          <a:prstGeom prst="rect">
+            <a:avLst/>
+          </a:prstGeom>
+          <a:noFill/>
+          <a:ln>
+            <a:noFill/>
+          </a:ln>
         </p:spPr>
         <p:txBody>
           <a:bodyPr lIns="90000" rIns="90000" tIns="45000" bIns="45000"/>
@@ -3511,13 +3634,13 @@
               <a:rPr b="1" lang="es-EC" sz="2400">
                 <a:latin typeface="Colibri"/>
               </a:rPr>
-              <a:t>PAGO:</a:t>
-            </a:r>
-            <a:r>
-              <a:rPr lang="es-EC" sz="2400">
-                <a:latin typeface="Colibri"/>
-              </a:rPr>
-              <a:t> Calcula el pago de un préstamo basado en pagos y tasa de Interés constantes.</a:t>
+              <a:t>LETRA.DE.TES.RENDTO:</a:t>
+            </a:r>
+            <a:r>
+              <a:rPr lang="es-EC" sz="2400">
+                <a:latin typeface="Colibri"/>
+              </a:rPr>
+              <a:t> Devuelve el rendimiento de una letra de tesorería.</a:t>
             </a:r>
             <a:endParaRPr/>
           </a:p>
@@ -3526,13 +3649,13 @@
               <a:rPr b="1" lang="es-EC" sz="2400">
                 <a:latin typeface="Colibri"/>
               </a:rPr>
-              <a:t>PAGO.INT.ENTRE:</a:t>
-            </a:r>
-            <a:r>
-              <a:rPr lang="es-EC" sz="2400">
-                <a:latin typeface="Colibri"/>
-              </a:rPr>
-              <a:t> Devuelve el pago de Intereses Acumulativo entre dos períodos.</a:t>
+              <a:t>LETRA.DE.TEST.EQV.A.BONO:</a:t>
+            </a:r>
+            <a:r>
+              <a:rPr lang="es-EC" sz="2400">
+                <a:latin typeface="Colibri"/>
+              </a:rPr>
+              <a:t> Devuelve el Rendimiento para un bono equivalente a una letra de tesorería.</a:t>
             </a:r>
             <a:endParaRPr/>
           </a:p>
@@ -3541,13 +3664,13 @@
               <a:rPr b="1" lang="es-EC" sz="2400">
                 <a:latin typeface="Colibri"/>
               </a:rPr>
-              <a:t>PAGO.PRINC.ENTRE:</a:t>
-            </a:r>
-            <a:r>
-              <a:rPr lang="es-EC" sz="2400">
-                <a:latin typeface="Colibri"/>
-              </a:rPr>
-              <a:t> Devuelve el pago principal acumulativo de un préstamo entre dos períodos.</a:t>
+              <a:t>MONEDA.DEC:</a:t>
+            </a:r>
+            <a:r>
+              <a:rPr lang="es-EC" sz="2400">
+                <a:latin typeface="Colibri"/>
+              </a:rPr>
+              <a:t> Convierte un precio en dólar, Expresado como fracción, en un precio en Dólares, Expresado como número decimal. </a:t>
             </a:r>
             <a:endParaRPr/>
           </a:p>
@@ -3556,13 +3679,13 @@
               <a:rPr b="1" lang="es-EC" sz="2400">
                 <a:latin typeface="Colibri"/>
               </a:rPr>
-              <a:t>PAGOINT:</a:t>
-            </a:r>
-            <a:r>
-              <a:rPr lang="es-EC" sz="2400">
-                <a:latin typeface="Colibri"/>
-              </a:rPr>
-              <a:t> Devuelve el interés pagado por una Inversión durante un Período determinado, basado en Pagos periódicos y constantes y una tasa de Interés constante.</a:t>
+              <a:t>MONEDA.FRAC:</a:t>
+            </a:r>
+            <a:r>
+              <a:rPr lang="es-EC" sz="2400">
+                <a:latin typeface="Colibri"/>
+              </a:rPr>
+              <a:t> Convierte un precio en dólar, Expresado como número decimal, en un precio en dólares, Expresado como una fracción.</a:t>
             </a:r>
             <a:endParaRPr/>
           </a:p>
@@ -3571,28 +3694,13 @@
               <a:rPr b="1" lang="es-EC" sz="2400">
                 <a:latin typeface="Colibri"/>
               </a:rPr>
-              <a:t>PAGOPRIN:</a:t>
-            </a:r>
-            <a:r>
-              <a:rPr lang="es-EC" sz="2400">
-                <a:latin typeface="Colibri"/>
-              </a:rPr>
-              <a:t> Devuelve el pago del capital de una Inversión Determinada, basado en Pagos constantes y periódicos, y una tasa de Interés constante.</a:t>
-            </a:r>
-            <a:endParaRPr/>
-          </a:p>
-          <a:p>
-            <a:r>
-              <a:rPr b="1" lang="es-EC" sz="2400">
-                <a:latin typeface="Colibri"/>
-              </a:rPr>
-              <a:t>PRECIO:</a:t>
-            </a:r>
-            <a:r>
-              <a:rPr lang="es-EC" sz="2400">
-                <a:latin typeface="Colibri"/>
-              </a:rPr>
-              <a:t> Devuelve el precio por 100$ de valor nominal de un valor bursátil que paga una tasa de interés periódica.</a:t>
+              <a:t>NPER:</a:t>
+            </a:r>
+            <a:r>
+              <a:rPr lang="es-EC" sz="2400">
+                <a:latin typeface="Colibri"/>
+              </a:rPr>
+              <a:t> Devuelve el número de pagos de una Inversión, basado en Pagos constantes y periódicos y una tasa de Interés constante.</a:t>
             </a:r>
             <a:endParaRPr/>
           </a:p>
@@ -3606,10 +3714,10 @@
   <p:timing>
     <p:tnLst>
       <p:par>
-        <p:cTn id="11" dur="indefinite" restart="never" nodeType="tmRoot">
+        <p:cTn id="9" dur="indefinite" restart="never" nodeType="tmRoot">
           <p:childTnLst>
             <p:seq>
-              <p:cTn id="12" nodeType="mainSeq"/>
+              <p:cTn id="10" nodeType="mainSeq"/>
               <p:prevCondLst>
                 <p:cond delay="0" evt="onPrev">
                   <p:tgtEl>
@@ -3652,18 +3760,22 @@
       </p:grpSpPr>
       <p:sp>
         <p:nvSpPr>
-          <p:cNvPr id="80" name="TextShape 1"/>
-          <p:cNvSpPr txBox="1"/>
+          <p:cNvPr id="81" name="CustomShape 1"/>
+          <p:cNvSpPr/>
           <p:nvPr/>
         </p:nvSpPr>
         <p:spPr>
           <a:xfrm>
             <a:off x="360000" y="360000"/>
-            <a:ext cx="8424000" cy="3301200"/>
-          </a:xfrm>
-          <a:prstGeom prst="rect">
-            <a:avLst/>
-          </a:prstGeom>
+            <a:ext cx="8351280" cy="6154560"/>
+          </a:xfrm>
+          <a:prstGeom prst="rect">
+            <a:avLst/>
+          </a:prstGeom>
+          <a:noFill/>
+          <a:ln>
+            <a:noFill/>
+          </a:ln>
         </p:spPr>
         <p:txBody>
           <a:bodyPr lIns="90000" rIns="90000" tIns="45000" bIns="45000"/>
@@ -3672,13 +3784,13 @@
               <a:rPr b="1" lang="es-EC" sz="2400">
                 <a:latin typeface="Colibri"/>
               </a:rPr>
-              <a:t>PRECIO.DESCUENTO:</a:t>
-            </a:r>
-            <a:r>
-              <a:rPr lang="es-EC" sz="2400">
-                <a:latin typeface="Colibri"/>
-              </a:rPr>
-              <a:t> Devuelve el precio por 100$ de un valor nominal de un valor bursátil con descuento.</a:t>
+              <a:t>PAGO:</a:t>
+            </a:r>
+            <a:r>
+              <a:rPr lang="es-EC" sz="2400">
+                <a:latin typeface="Colibri"/>
+              </a:rPr>
+              <a:t> Calcula el pago de un préstamo basado en pagos y tasa de Interés constantes.</a:t>
             </a:r>
             <a:endParaRPr/>
           </a:p>
@@ -3687,13 +3799,13 @@
               <a:rPr b="1" lang="es-EC" sz="2400">
                 <a:latin typeface="Colibri"/>
               </a:rPr>
-              <a:t>PRECIO.VENCIMIENTO:</a:t>
-            </a:r>
-            <a:r>
-              <a:rPr lang="es-EC" sz="2400">
-                <a:latin typeface="Colibri"/>
-              </a:rPr>
-              <a:t> Devuelve el precio por 100$ de un valor nominal que Genera intereses al vencimiento.</a:t>
+              <a:t>PAGO.INT.ENTRE:</a:t>
+            </a:r>
+            <a:r>
+              <a:rPr lang="es-EC" sz="2400">
+                <a:latin typeface="Colibri"/>
+              </a:rPr>
+              <a:t> Devuelve el pago de Intereses Acumulativo entre dos períodos.</a:t>
             </a:r>
             <a:endParaRPr/>
           </a:p>
@@ -3702,13 +3814,58 @@
               <a:rPr b="1" lang="es-EC" sz="2400">
                 <a:latin typeface="Colibri"/>
               </a:rPr>
-              <a:t>RENDTO: </a:t>
-            </a:r>
-            <a:r>
-              <a:rPr lang="es-EC" sz="2400">
-                <a:latin typeface="Colibri"/>
-              </a:rPr>
-              <a:t>Devuelve el rendimiento de un valor bursátil que Obtiene Intereses periódicos.</a:t>
+              <a:t>PAGO.PRINC.ENTRE:</a:t>
+            </a:r>
+            <a:r>
+              <a:rPr lang="es-EC" sz="2400">
+                <a:latin typeface="Colibri"/>
+              </a:rPr>
+              <a:t> Devuelve el pago principal acumulativo de un préstamo entre dos períodos.</a:t>
+            </a:r>
+            <a:endParaRPr/>
+          </a:p>
+          <a:p>
+            <a:r>
+              <a:rPr b="1" lang="es-EC" sz="2400">
+                <a:latin typeface="Colibri"/>
+              </a:rPr>
+              <a:t>PAGOINT:</a:t>
+            </a:r>
+            <a:r>
+              <a:rPr lang="es-EC" sz="2400">
+                <a:latin typeface="Colibri"/>
+              </a:rPr>
+              <a:t> Devuelve el interés pagado por una Inversión durante un Período determinado, basado en Pagos periódicos y constantes y una tasa de Interés constante.</a:t>
+            </a:r>
+            <a:endParaRPr/>
+          </a:p>
+          <a:p>
+            <a:r>
+              <a:rPr b="1" lang="es-EC" sz="2400">
+                <a:latin typeface="Colibri"/>
+              </a:rPr>
+              <a:t>PAGOPRIN:</a:t>
+            </a:r>
+            <a:r>
+              <a:rPr lang="es-EC" sz="2400">
+                <a:latin typeface="Colibri"/>
+              </a:rPr>
+              <a:t> Devuelve el pago del capital de una Inversión Determinada, basado en Pagos constantes y periódicos, y una tasa de Interés constante.</a:t>
+            </a:r>
+            <a:endParaRPr/>
+          </a:p>
+          <a:p>
+            <a:r>
+              <a:rPr b="1" lang="es-EC" sz="2400">
+                <a:latin typeface="Colibri"/>
+              </a:rPr>
+              <a:t>PRECIO:</a:t>
+            </a:r>
+            <a:r>
+              <a:rPr lang="es-EC" sz="2400">
+                <a:latin typeface="Colibri"/>
+              </a:rPr>
+              <a:t> Devuelve el precio por 100$ de valor nominal de un valor bursátil que paga una tasa de interés periódica.</a:t>
             </a:r>
             <a:endParaRPr/>
           </a:p>
@@ -3719,6 +3876,390 @@
       </p:sp>
     </p:spTree>
   </p:cSld>
+  <p:timing>
+    <p:tnLst>
+      <p:par>
+        <p:cTn id="11" dur="indefinite" restart="never" nodeType="tmRoot">
+          <p:childTnLst>
+            <p:seq>
+              <p:cTn id="12" nodeType="mainSeq"/>
+              <p:prevCondLst>
+                <p:cond delay="0" evt="onPrev">
+                  <p:tgtEl>
+                    <p:sldTgt/>
+                  </p:tgtEl>
+                </p:cond>
+              </p:prevCondLst>
+              <p:nextCondLst>
+                <p:cond delay="0" evt="onNext">
+                  <p:tgtEl>
+                    <p:sldTgt/>
+                  </p:tgtEl>
+                </p:cond>
+              </p:nextCondLst>
+            </p:seq>
+          </p:childTnLst>
+        </p:cTn>
+      </p:par>
+    </p:tnLst>
+  </p:timing>
+</p:sld>
+</file>
+
+<file path=ppt/slides/slide8.xml><?xml version="1.0" encoding="utf-8"?>
+<p:sld xmlns:a="http://schemas.openxmlformats.org/drawingml/2006/main" xmlns:p="http://schemas.openxmlformats.org/presentationml/2006/main" xmlns:r="http://schemas.openxmlformats.org/officeDocument/2006/relationships">
+  <p:cSld>
+    <p:spTree>
+      <p:nvGrpSpPr>
+        <p:cNvPr id="1" name=""/>
+        <p:cNvGrpSpPr/>
+        <p:nvPr/>
+      </p:nvGrpSpPr>
+      <p:grpSpPr>
+        <a:xfrm>
+          <a:off x="0" y="0"/>
+          <a:ext cx="0" cy="0"/>
+          <a:chOff x="0" y="0"/>
+          <a:chExt cx="0" cy="0"/>
+        </a:xfrm>
+      </p:grpSpPr>
+      <p:sp>
+        <p:nvSpPr>
+          <p:cNvPr id="82" name="CustomShape 1"/>
+          <p:cNvSpPr/>
+          <p:nvPr/>
+        </p:nvSpPr>
+        <p:spPr>
+          <a:xfrm>
+            <a:off x="360000" y="360000"/>
+            <a:ext cx="8423280" cy="3300480"/>
+          </a:xfrm>
+          <a:prstGeom prst="rect">
+            <a:avLst/>
+          </a:prstGeom>
+          <a:noFill/>
+          <a:ln>
+            <a:noFill/>
+          </a:ln>
+        </p:spPr>
+        <p:txBody>
+          <a:bodyPr lIns="90000" rIns="90000" tIns="45000" bIns="45000"/>
+          <a:p>
+            <a:r>
+              <a:rPr b="1" lang="es-EC" sz="2400">
+                <a:latin typeface="Colibri"/>
+              </a:rPr>
+              <a:t>PRECIO.DESCUENTO:</a:t>
+            </a:r>
+            <a:r>
+              <a:rPr lang="es-EC" sz="2400">
+                <a:latin typeface="Colibri"/>
+              </a:rPr>
+              <a:t> Devuelve el precio por 100$ de un valor nominal de un valor bursátil con descuento.</a:t>
+            </a:r>
+            <a:endParaRPr/>
+          </a:p>
+          <a:p>
+            <a:r>
+              <a:rPr b="1" lang="es-EC" sz="2400">
+                <a:latin typeface="Colibri"/>
+              </a:rPr>
+              <a:t>PRECIO.VENCIMIENTO:</a:t>
+            </a:r>
+            <a:r>
+              <a:rPr lang="es-EC" sz="2400">
+                <a:latin typeface="Colibri"/>
+              </a:rPr>
+              <a:t> Devuelve el precio por 100$ de un valor nominal que Genera intereses al vencimiento.</a:t>
+            </a:r>
+            <a:endParaRPr/>
+          </a:p>
+          <a:p>
+            <a:r>
+              <a:rPr b="1" lang="es-EC" sz="2400">
+                <a:latin typeface="Colibri"/>
+              </a:rPr>
+              <a:t>RENDTO: </a:t>
+            </a:r>
+            <a:r>
+              <a:rPr lang="es-EC" sz="2400">
+                <a:latin typeface="Colibri"/>
+              </a:rPr>
+              <a:t>Devuelve el rendimiento de un valor bursátil que Obtiene Intereses periódicos.</a:t>
+            </a:r>
+            <a:endParaRPr/>
+          </a:p>
+          <a:p>
+            <a:r>
+              <a:rPr b="1" lang="es-EC" sz="2400">
+                <a:latin typeface="Colibri"/>
+              </a:rPr>
+              <a:t>RENDTO.DESC:</a:t>
+            </a:r>
+            <a:r>
+              <a:rPr lang="es-EC" sz="2400">
+                <a:latin typeface="Colibri"/>
+              </a:rPr>
+              <a:t> Devuelve el Rendimiento anual para el valor bursátil con descuento.</a:t>
+            </a:r>
+            <a:endParaRPr/>
+          </a:p>
+          <a:p>
+            <a:r>
+              <a:rPr b="1" lang="es-EC" sz="2400">
+                <a:latin typeface="Colibri"/>
+              </a:rPr>
+              <a:t>RENDTO.VENCTO:</a:t>
+            </a:r>
+            <a:r>
+              <a:rPr lang="es-EC" sz="2400">
+                <a:latin typeface="Colibri"/>
+              </a:rPr>
+              <a:t> Devuelve el interés anual de un valor que Genera intereses al vencimiento.</a:t>
+            </a:r>
+            <a:endParaRPr/>
+          </a:p>
+          <a:p>
+            <a:r>
+              <a:rPr b="1" lang="es-EC" sz="2400">
+                <a:latin typeface="Colibri"/>
+              </a:rPr>
+              <a:t>SLN:</a:t>
+            </a:r>
+            <a:r>
+              <a:rPr lang="es-EC" sz="2400">
+                <a:latin typeface="Colibri"/>
+              </a:rPr>
+              <a:t> Devuelve la Depreciación por método directo de un activo en un período dado.</a:t>
+            </a:r>
+            <a:endParaRPr/>
+          </a:p>
+          <a:p>
+            <a:r>
+              <a:rPr b="1" lang="es-EC" sz="2400">
+                <a:latin typeface="Colibri"/>
+              </a:rPr>
+              <a:t>SYD:</a:t>
+            </a:r>
+            <a:r>
+              <a:rPr lang="es-EC" sz="2400">
+                <a:latin typeface="Colibri"/>
+              </a:rPr>
+              <a:t> Devuelve la Depreciación por método de anualidades de un activo durante un Período específico.</a:t>
+            </a:r>
+            <a:endParaRPr/>
+          </a:p>
+        </p:txBody>
+      </p:sp>
+    </p:spTree>
+  </p:cSld>
+  <p:timing>
+    <p:tnLst>
+      <p:par>
+        <p:cTn id="13" dur="indefinite" restart="never" nodeType="tmRoot">
+          <p:childTnLst>
+            <p:seq>
+              <p:cTn id="14" nodeType="mainSeq"/>
+              <p:prevCondLst>
+                <p:cond delay="0" evt="onPrev">
+                  <p:tgtEl>
+                    <p:sldTgt/>
+                  </p:tgtEl>
+                </p:cond>
+              </p:prevCondLst>
+              <p:nextCondLst>
+                <p:cond delay="0" evt="onNext">
+                  <p:tgtEl>
+                    <p:sldTgt/>
+                  </p:tgtEl>
+                </p:cond>
+              </p:nextCondLst>
+            </p:seq>
+          </p:childTnLst>
+        </p:cTn>
+      </p:par>
+    </p:tnLst>
+  </p:timing>
+</p:sld>
+</file>
+
+<file path=ppt/slides/slide9.xml><?xml version="1.0" encoding="utf-8"?>
+<p:sld xmlns:a="http://schemas.openxmlformats.org/drawingml/2006/main" xmlns:p="http://schemas.openxmlformats.org/presentationml/2006/main" xmlns:r="http://schemas.openxmlformats.org/officeDocument/2006/relationships">
+  <p:cSld>
+    <p:spTree>
+      <p:nvGrpSpPr>
+        <p:cNvPr id="1" name=""/>
+        <p:cNvGrpSpPr/>
+        <p:nvPr/>
+      </p:nvGrpSpPr>
+      <p:grpSpPr>
+        <a:xfrm>
+          <a:off x="0" y="0"/>
+          <a:ext cx="0" cy="0"/>
+          <a:chOff x="0" y="0"/>
+          <a:chExt cx="0" cy="0"/>
+        </a:xfrm>
+      </p:grpSpPr>
+      <p:sp>
+        <p:nvSpPr>
+          <p:cNvPr id="83" name="CustomShape 1"/>
+          <p:cNvSpPr/>
+          <p:nvPr/>
+        </p:nvSpPr>
+        <p:spPr>
+          <a:xfrm>
+            <a:off x="216000" y="288000"/>
+            <a:ext cx="8783640" cy="6154920"/>
+          </a:xfrm>
+          <a:prstGeom prst="rect">
+            <a:avLst/>
+          </a:prstGeom>
+          <a:noFill/>
+          <a:ln>
+            <a:noFill/>
+          </a:ln>
+        </p:spPr>
+        <p:txBody>
+          <a:bodyPr lIns="90000" rIns="90000" tIns="45000" bIns="45000"/>
+          <a:p>
+            <a:r>
+              <a:rPr b="1" lang="es-EC" sz="2400">
+                <a:latin typeface="Colibri"/>
+              </a:rPr>
+              <a:t>TASA:</a:t>
+            </a:r>
+            <a:r>
+              <a:rPr lang="es-EC" sz="2400">
+                <a:latin typeface="Colibri"/>
+              </a:rPr>
+              <a:t> Devuelve la tasa de interés por período de un préstamo o una inversión.</a:t>
+            </a:r>
+            <a:endParaRPr/>
+          </a:p>
+          <a:p>
+            <a:r>
+              <a:rPr b="1" lang="es-EC" sz="2400">
+                <a:latin typeface="Colibri"/>
+              </a:rPr>
+              <a:t>TASA.DESC:</a:t>
+            </a:r>
+            <a:r>
+              <a:rPr lang="es-EC" sz="2400">
+                <a:latin typeface="Colibri"/>
+              </a:rPr>
+              <a:t> Devuelve la tasa de descuento del valor bursátil.</a:t>
+            </a:r>
+            <a:endParaRPr/>
+          </a:p>
+          <a:p>
+            <a:r>
+              <a:rPr b="1" lang="es-EC" sz="2400">
+                <a:latin typeface="Colibri"/>
+              </a:rPr>
+              <a:t>TASA.INT:</a:t>
+            </a:r>
+            <a:r>
+              <a:rPr lang="es-EC" sz="2400">
+                <a:latin typeface="Colibri"/>
+              </a:rPr>
+              <a:t> Devuelve la tasa de interés para la inversión total en un valor bursátil.</a:t>
+            </a:r>
+            <a:endParaRPr/>
+          </a:p>
+          <a:p>
+            <a:r>
+              <a:rPr b="1" lang="es-EC" sz="2400">
+                <a:latin typeface="Colibri"/>
+              </a:rPr>
+              <a:t>TASA.NOMINAL:</a:t>
+            </a:r>
+            <a:r>
+              <a:rPr lang="es-EC" sz="2400">
+                <a:latin typeface="Colibri"/>
+              </a:rPr>
+              <a:t> Devuelve la tasa de interés nominal anual.</a:t>
+            </a:r>
+            <a:endParaRPr/>
+          </a:p>
+          <a:p>
+            <a:r>
+              <a:rPr b="1" lang="es-EC" sz="2400">
+                <a:latin typeface="Colibri"/>
+              </a:rPr>
+              <a:t>TIR:</a:t>
+            </a:r>
+            <a:r>
+              <a:rPr lang="es-EC" sz="2400">
+                <a:latin typeface="Colibri"/>
+              </a:rPr>
+              <a:t> Devuelve la tasa interna de retorno de una inversión para una serie de valores en efectivo.</a:t>
+            </a:r>
+            <a:endParaRPr/>
+          </a:p>
+          <a:p>
+            <a:r>
+              <a:rPr b="1" lang="es-EC" sz="2400">
+                <a:latin typeface="Colibri"/>
+              </a:rPr>
+              <a:t>TIR.NO.PER:</a:t>
+            </a:r>
+            <a:r>
+              <a:rPr lang="es-EC" sz="2400">
+                <a:latin typeface="Colibri"/>
+              </a:rPr>
+              <a:t> Devuelve la tasa interna de retorno para un flujo de caja que no es Necesariamente periódico.</a:t>
+            </a:r>
+            <a:endParaRPr/>
+          </a:p>
+          <a:p>
+            <a:r>
+              <a:rPr b="1" lang="es-EC" sz="2400">
+                <a:latin typeface="Colibri"/>
+              </a:rPr>
+              <a:t>TIRM:</a:t>
+            </a:r>
+            <a:r>
+              <a:rPr lang="es-EC" sz="2400">
+                <a:latin typeface="Colibri"/>
+              </a:rPr>
+              <a:t> Devuelve la tasa interna de retorno para una serie de flujos de Efectivo Periódicos, Considerando costo de la inversión e interés al volver a invertir el efectivo.</a:t>
+            </a:r>
+            <a:endParaRPr/>
+          </a:p>
+          <a:p>
+            <a:endParaRPr/>
+          </a:p>
+        </p:txBody>
+      </p:sp>
+    </p:spTree>
+  </p:cSld>
+  <p:timing>
+    <p:tnLst>
+      <p:par>
+        <p:cTn id="15" dur="indefinite" restart="never" nodeType="tmRoot">
+          <p:childTnLst>
+            <p:seq>
+              <p:cTn id="16" nodeType="mainSeq"/>
+              <p:prevCondLst>
+                <p:cond delay="0" evt="onPrev">
+                  <p:tgtEl>
+                    <p:sldTgt/>
+                  </p:tgtEl>
+                </p:cond>
+              </p:prevCondLst>
+              <p:nextCondLst>
+                <p:cond delay="0" evt="onNext">
+                  <p:tgtEl>
+                    <p:sldTgt/>
+                  </p:tgtEl>
+                </p:cond>
+              </p:nextCondLst>
+            </p:seq>
+          </p:childTnLst>
+        </p:cTn>
+      </p:par>
+    </p:tnLst>
+  </p:timing>
 </p:sld>
 </file>
 

</xml_diff>

<commit_message>
se subio toda la informacion de clases para informatica basica e aplicada
</commit_message>
<xml_diff>
--- a/2015-2016/clases/computacion_aplicada_2/clase_6/clase_6.pptx
+++ b/2015-2016/clases/computacion_aplicada_2/clase_6/clase_6.pptx
@@ -16,6 +16,10 @@
     <p:sldId id="263" r:id="rId11"/>
     <p:sldId id="264" r:id="rId12"/>
     <p:sldId id="265" r:id="rId13"/>
+    <p:sldId id="266" r:id="rId14"/>
+    <p:sldId id="267" r:id="rId15"/>
+    <p:sldId id="268" r:id="rId16"/>
+    <p:sldId id="269" r:id="rId17"/>
   </p:sldIdLst>
   <p:sldSz cx="9144000" cy="6858000"/>
   <p:notesSz cx="7559675" cy="10691812"/>
@@ -2878,97 +2882,27 @@
       </p:grpSpPr>
       <p:sp>
         <p:nvSpPr>
-          <p:cNvPr id="84" name="CustomShape 1"/>
-          <p:cNvSpPr/>
+          <p:cNvPr id="83" name="TextShape 1"/>
+          <p:cNvSpPr txBox="1"/>
           <p:nvPr/>
         </p:nvSpPr>
         <p:spPr>
           <a:xfrm>
-            <a:off x="360000" y="432000"/>
-            <a:ext cx="8351640" cy="5441400"/>
-          </a:xfrm>
-          <a:prstGeom prst="rect">
-            <a:avLst/>
-          </a:prstGeom>
-          <a:noFill/>
-          <a:ln>
-            <a:noFill/>
-          </a:ln>
+            <a:off x="3528000" y="2739240"/>
+            <a:ext cx="2592000" cy="716760"/>
+          </a:xfrm>
+          <a:prstGeom prst="rect">
+            <a:avLst/>
+          </a:prstGeom>
         </p:spPr>
         <p:txBody>
           <a:bodyPr lIns="90000" rIns="90000" tIns="45000" bIns="45000"/>
           <a:p>
             <a:r>
-              <a:rPr b="1" lang="es-EC" sz="2400">
-                <a:latin typeface="Colibri"/>
-              </a:rPr>
-              <a:t>VA:</a:t>
-            </a:r>
-            <a:r>
-              <a:rPr lang="es-EC" sz="2400">
-                <a:latin typeface="Colibri"/>
-              </a:rPr>
-              <a:t> Devuelve el valor presente de una inversión: la suma total del valor actual de una serie de pagos futuros.</a:t>
-            </a:r>
-            <a:endParaRPr/>
-          </a:p>
-          <a:p>
-            <a:r>
-              <a:rPr b="1" lang="es-EC" sz="2400">
-                <a:latin typeface="Colibri"/>
-              </a:rPr>
-              <a:t>VF:</a:t>
-            </a:r>
-            <a:r>
-              <a:rPr lang="es-EC" sz="2400">
-                <a:latin typeface="Colibri"/>
-              </a:rPr>
-              <a:t> Devuelve el valor futuro de una inversión basado en Pagos periódicos y constantes, y una tasa de interés también constante.</a:t>
-            </a:r>
-            <a:endParaRPr/>
-          </a:p>
-          <a:p>
-            <a:r>
-              <a:rPr b="1" lang="es-EC" sz="2400">
-                <a:latin typeface="Colibri"/>
-              </a:rPr>
-              <a:t>VF.PLAN:</a:t>
-            </a:r>
-            <a:r>
-              <a:rPr lang="es-EC" sz="2400">
-                <a:latin typeface="Colibri"/>
-              </a:rPr>
-              <a:t> Devuelve el valor futuro de una inversión inicial después de aplicar una serie de tasas de interés compuesto. </a:t>
-            </a:r>
-            <a:endParaRPr/>
-          </a:p>
-          <a:p>
-            <a:r>
-              <a:rPr b="1" lang="es-EC" sz="2400">
-                <a:latin typeface="Colibri"/>
-              </a:rPr>
-              <a:t>VNA:</a:t>
-            </a:r>
-            <a:r>
-              <a:rPr lang="es-EC" sz="2400">
-                <a:latin typeface="Colibri"/>
-              </a:rPr>
-              <a:t> Devuelve el valor neto actual de una inversión  partir de una tasa de descuento y una serie de pagos futuros (valores negativos) y Entradas (valores positivos).</a:t>
-            </a:r>
-            <a:endParaRPr/>
-          </a:p>
-          <a:p>
-            <a:r>
-              <a:rPr b="1" lang="es-EC" sz="2400">
-                <a:latin typeface="Colibri"/>
-              </a:rPr>
-              <a:t>VNA.NO.PER:</a:t>
-            </a:r>
-            <a:r>
-              <a:rPr lang="es-EC" sz="2400">
-                <a:latin typeface="Colibri"/>
-              </a:rPr>
-              <a:t> Devuelve el valor neto actual para un flujo de caja que no es Necesariamente periódico.</a:t>
+              <a:rPr lang="es-EC" sz="4400">
+                <a:latin typeface="Arial"/>
+              </a:rPr>
+              <a:t>Practica</a:t>
             </a:r>
             <a:endParaRPr/>
           </a:p>
@@ -2979,10 +2913,521 @@
   <p:timing>
     <p:tnLst>
       <p:par>
-        <p:cTn id="17" dur="indefinite" restart="never" nodeType="tmRoot">
+        <p:cTn id="19" dur="indefinite" restart="never" nodeType="tmRoot">
           <p:childTnLst>
             <p:seq>
-              <p:cTn id="18" nodeType="mainSeq"/>
+              <p:cTn id="20" nodeType="mainSeq"/>
+              <p:prevCondLst>
+                <p:cond delay="0" evt="onPrev">
+                  <p:tgtEl>
+                    <p:sldTgt/>
+                  </p:tgtEl>
+                </p:cond>
+              </p:prevCondLst>
+              <p:nextCondLst>
+                <p:cond delay="0" evt="onNext">
+                  <p:tgtEl>
+                    <p:sldTgt/>
+                  </p:tgtEl>
+                </p:cond>
+              </p:nextCondLst>
+            </p:seq>
+          </p:childTnLst>
+        </p:cTn>
+      </p:par>
+    </p:tnLst>
+  </p:timing>
+</p:sld>
+</file>
+
+<file path=ppt/slides/slide11.xml><?xml version="1.0" encoding="utf-8"?>
+<p:sld xmlns:a="http://schemas.openxmlformats.org/drawingml/2006/main" xmlns:p="http://schemas.openxmlformats.org/presentationml/2006/main" xmlns:r="http://schemas.openxmlformats.org/officeDocument/2006/relationships">
+  <p:cSld>
+    <p:spTree>
+      <p:nvGrpSpPr>
+        <p:cNvPr id="1" name=""/>
+        <p:cNvGrpSpPr/>
+        <p:nvPr/>
+      </p:nvGrpSpPr>
+      <p:grpSpPr>
+        <a:xfrm>
+          <a:off x="0" y="0"/>
+          <a:ext cx="0" cy="0"/>
+          <a:chOff x="0" y="0"/>
+          <a:chExt cx="0" cy="0"/>
+        </a:xfrm>
+      </p:grpSpPr>
+      <p:sp>
+        <p:nvSpPr>
+          <p:cNvPr id="84" name="TextShape 1"/>
+          <p:cNvSpPr txBox="1"/>
+          <p:nvPr/>
+        </p:nvSpPr>
+        <p:spPr>
+          <a:xfrm>
+            <a:off x="576000" y="360000"/>
+            <a:ext cx="8136000" cy="6054480"/>
+          </a:xfrm>
+          <a:prstGeom prst="rect">
+            <a:avLst/>
+          </a:prstGeom>
+        </p:spPr>
+        <p:txBody>
+          <a:bodyPr lIns="90000" rIns="90000" tIns="45000" bIns="45000"/>
+          <a:p>
+            <a:r>
+              <a:rPr lang="es-EC" sz="2400">
+                <a:latin typeface="Colibri"/>
+              </a:rPr>
+              <a:t>1) El Sr. Pérez depositó en un banco $ 1,000 y los dejó 9 meses a una tasa de interés del 22% en interés simple. ¿Cuánto retiró en total?</a:t>
+            </a:r>
+            <a:endParaRPr/>
+          </a:p>
+          <a:p>
+            <a:endParaRPr/>
+          </a:p>
+          <a:p>
+            <a:r>
+              <a:rPr lang="es-EC" sz="2400">
+                <a:latin typeface="Colibri"/>
+              </a:rPr>
+              <a:t>2) ¿Cuánto le costará por concepto de intereses en préstamo de $ 100,000 por 6 trimestres a una tasa de interés anual del 24%?</a:t>
+            </a:r>
+            <a:endParaRPr/>
+          </a:p>
+          <a:p>
+            <a:endParaRPr/>
+          </a:p>
+          <a:p>
+            <a:r>
+              <a:rPr lang="es-EC" sz="2400">
+                <a:latin typeface="Colibri"/>
+              </a:rPr>
+              <a:t>3)¿Cuál será el valor futuro o monto de una inversión de $ 40,000 que se colocó en un banco durante 6 trimestres a una tasa del 36% y cuál fue el interés generado?</a:t>
+            </a:r>
+            <a:endParaRPr/>
+          </a:p>
+          <a:p>
+            <a:endParaRPr/>
+          </a:p>
+          <a:p>
+            <a:r>
+              <a:rPr lang="es-EC" sz="2400">
+                <a:latin typeface="Colibri"/>
+              </a:rPr>
+              <a:t>4)¿Cuánto tendría usted que pagar por un préstamo de $ 2,000 a 60 días al 48% anual? ¿Cuánto corresponde a interés?</a:t>
+            </a:r>
+            <a:endParaRPr/>
+          </a:p>
+          <a:p>
+            <a:endParaRPr/>
+          </a:p>
+        </p:txBody>
+      </p:sp>
+    </p:spTree>
+  </p:cSld>
+  <p:timing>
+    <p:tnLst>
+      <p:par>
+        <p:cTn id="21" dur="indefinite" restart="never" nodeType="tmRoot">
+          <p:childTnLst>
+            <p:seq>
+              <p:cTn id="22" nodeType="mainSeq"/>
+              <p:prevCondLst>
+                <p:cond delay="0" evt="onPrev">
+                  <p:tgtEl>
+                    <p:sldTgt/>
+                  </p:tgtEl>
+                </p:cond>
+              </p:prevCondLst>
+              <p:nextCondLst>
+                <p:cond delay="0" evt="onNext">
+                  <p:tgtEl>
+                    <p:sldTgt/>
+                  </p:tgtEl>
+                </p:cond>
+              </p:nextCondLst>
+            </p:seq>
+          </p:childTnLst>
+        </p:cTn>
+      </p:par>
+    </p:tnLst>
+  </p:timing>
+</p:sld>
+</file>
+
+<file path=ppt/slides/slide12.xml><?xml version="1.0" encoding="utf-8"?>
+<p:sld xmlns:a="http://schemas.openxmlformats.org/drawingml/2006/main" xmlns:p="http://schemas.openxmlformats.org/presentationml/2006/main" xmlns:r="http://schemas.openxmlformats.org/officeDocument/2006/relationships">
+  <p:cSld>
+    <p:spTree>
+      <p:nvGrpSpPr>
+        <p:cNvPr id="1" name=""/>
+        <p:cNvGrpSpPr/>
+        <p:nvPr/>
+      </p:nvGrpSpPr>
+      <p:grpSpPr>
+        <a:xfrm>
+          <a:off x="0" y="0"/>
+          <a:ext cx="0" cy="0"/>
+          <a:chOff x="0" y="0"/>
+          <a:chExt cx="0" cy="0"/>
+        </a:xfrm>
+      </p:grpSpPr>
+      <p:sp>
+        <p:nvSpPr>
+          <p:cNvPr id="85" name="TextShape 1"/>
+          <p:cNvSpPr txBox="1"/>
+          <p:nvPr/>
+        </p:nvSpPr>
+        <p:spPr>
+          <a:xfrm>
+            <a:off x="432000" y="504000"/>
+            <a:ext cx="8280000" cy="7939080"/>
+          </a:xfrm>
+          <a:prstGeom prst="rect">
+            <a:avLst/>
+          </a:prstGeom>
+        </p:spPr>
+        <p:txBody>
+          <a:bodyPr lIns="90000" rIns="90000" tIns="45000" bIns="45000"/>
+          <a:p>
+            <a:r>
+              <a:rPr lang="es-EC" sz="2400">
+                <a:latin typeface="Colibri"/>
+              </a:rPr>
+              <a:t>5) Usando tabla de capitalización, fórmula y calculadora financiera determine el valor futuro de una inversión de $ 20,000 a 2.5 años al 30% anual con capitalización semestral. ¿Cuánto corresponde a intereses?</a:t>
+            </a:r>
+            <a:endParaRPr/>
+          </a:p>
+          <a:p>
+            <a:endParaRPr/>
+          </a:p>
+          <a:p>
+            <a:r>
+              <a:rPr lang="es-EC" sz="2400">
+                <a:latin typeface="Colibri"/>
+              </a:rPr>
+              <a:t>6) Una empresa de factoraje adquiere una factura con un valor de $ 40,000 que vence dentro de 10 meses. Si negoció una tasa de interés del 24% con capitalización mensual, ¿Cuánto pagará por la factura?</a:t>
+            </a:r>
+            <a:endParaRPr/>
+          </a:p>
+          <a:p>
+            <a:endParaRPr/>
+          </a:p>
+          <a:p>
+            <a:r>
+              <a:rPr lang="es-EC" sz="2400">
+                <a:latin typeface="Colibri"/>
+              </a:rPr>
+              <a:t>7) El Sr. Rodríguez necesita $ 80,000 dentro de 8 meses y al día de hoy cuenta con fondos. ¿Cuánto necesita depositar en este momento para reunir los $ 80,000 si la tasa de interés que le ofrece el banco es de un 30% con capitalización mensual.</a:t>
+            </a:r>
+            <a:endParaRPr/>
+          </a:p>
+          <a:p>
+            <a:endParaRPr/>
+          </a:p>
+          <a:p>
+            <a:endParaRPr/>
+          </a:p>
+          <a:p>
+            <a:endParaRPr/>
+          </a:p>
+          <a:p>
+            <a:endParaRPr/>
+          </a:p>
+          <a:p>
+            <a:endParaRPr/>
+          </a:p>
+        </p:txBody>
+      </p:sp>
+    </p:spTree>
+  </p:cSld>
+  <p:timing>
+    <p:tnLst>
+      <p:par>
+        <p:cTn id="23" dur="indefinite" restart="never" nodeType="tmRoot">
+          <p:childTnLst>
+            <p:seq>
+              <p:cTn id="24" nodeType="mainSeq"/>
+              <p:prevCondLst>
+                <p:cond delay="0" evt="onPrev">
+                  <p:tgtEl>
+                    <p:sldTgt/>
+                  </p:tgtEl>
+                </p:cond>
+              </p:prevCondLst>
+              <p:nextCondLst>
+                <p:cond delay="0" evt="onNext">
+                  <p:tgtEl>
+                    <p:sldTgt/>
+                  </p:tgtEl>
+                </p:cond>
+              </p:nextCondLst>
+            </p:seq>
+          </p:childTnLst>
+        </p:cTn>
+      </p:par>
+    </p:tnLst>
+  </p:timing>
+</p:sld>
+</file>
+
+<file path=ppt/slides/slide13.xml><?xml version="1.0" encoding="utf-8"?>
+<p:sld xmlns:a="http://schemas.openxmlformats.org/drawingml/2006/main" xmlns:p="http://schemas.openxmlformats.org/presentationml/2006/main" xmlns:r="http://schemas.openxmlformats.org/officeDocument/2006/relationships">
+  <p:cSld>
+    <p:spTree>
+      <p:nvGrpSpPr>
+        <p:cNvPr id="1" name=""/>
+        <p:cNvGrpSpPr/>
+        <p:nvPr/>
+      </p:nvGrpSpPr>
+      <p:grpSpPr>
+        <a:xfrm>
+          <a:off x="0" y="0"/>
+          <a:ext cx="0" cy="0"/>
+          <a:chOff x="0" y="0"/>
+          <a:chExt cx="0" cy="0"/>
+        </a:xfrm>
+      </p:grpSpPr>
+      <p:sp>
+        <p:nvSpPr>
+          <p:cNvPr id="86" name="TextShape 1"/>
+          <p:cNvSpPr txBox="1"/>
+          <p:nvPr/>
+        </p:nvSpPr>
+        <p:spPr>
+          <a:xfrm>
+            <a:off x="432000" y="360000"/>
+            <a:ext cx="8280000" cy="4728240"/>
+          </a:xfrm>
+          <a:prstGeom prst="rect">
+            <a:avLst/>
+          </a:prstGeom>
+        </p:spPr>
+        <p:txBody>
+          <a:bodyPr lIns="90000" rIns="90000" tIns="45000" bIns="45000"/>
+          <a:p>
+            <a:r>
+              <a:rPr lang="es-EC" sz="2400">
+                <a:latin typeface="Colibri"/>
+              </a:rPr>
+              <a:t>8) Si la Sra. Juana del Pozo invirtió $ 2,000 durante un año y recibió $ 2,699.38. ¿A que tasa de interés con capitalización diaria colocó su inversión (año comercial)?</a:t>
+            </a:r>
+            <a:endParaRPr/>
+          </a:p>
+          <a:p>
+            <a:endParaRPr/>
+          </a:p>
+          <a:p>
+            <a:r>
+              <a:rPr lang="es-EC" sz="2400">
+                <a:latin typeface="Colibri"/>
+              </a:rPr>
+              <a:t>9) Si usted va a adquirir un auto a crédito y le indican que va a cubrir 40 mensualidades vencidas de $ 1,600 porque la tasa de interés que le aplicaron fue del 28% anual ¿Cuál es el valor del auto de contado? ¿Cuánto va a cubrir de intereses?</a:t>
+            </a:r>
+            <a:endParaRPr/>
+          </a:p>
+          <a:p>
+            <a:endParaRPr/>
+          </a:p>
+          <a:p>
+            <a:endParaRPr/>
+          </a:p>
+          <a:p>
+            <a:endParaRPr/>
+          </a:p>
+        </p:txBody>
+      </p:sp>
+    </p:spTree>
+  </p:cSld>
+  <p:timing>
+    <p:tnLst>
+      <p:par>
+        <p:cTn id="25" dur="indefinite" restart="never" nodeType="tmRoot">
+          <p:childTnLst>
+            <p:seq>
+              <p:cTn id="26" nodeType="mainSeq"/>
+              <p:prevCondLst>
+                <p:cond delay="0" evt="onPrev">
+                  <p:tgtEl>
+                    <p:sldTgt/>
+                  </p:tgtEl>
+                </p:cond>
+              </p:prevCondLst>
+              <p:nextCondLst>
+                <p:cond delay="0" evt="onNext">
+                  <p:tgtEl>
+                    <p:sldTgt/>
+                  </p:tgtEl>
+                </p:cond>
+              </p:nextCondLst>
+            </p:seq>
+          </p:childTnLst>
+        </p:cTn>
+      </p:par>
+    </p:tnLst>
+  </p:timing>
+</p:sld>
+</file>
+
+<file path=ppt/slides/slide14.xml><?xml version="1.0" encoding="utf-8"?>
+<p:sld xmlns:a="http://schemas.openxmlformats.org/drawingml/2006/main" xmlns:p="http://schemas.openxmlformats.org/presentationml/2006/main" xmlns:r="http://schemas.openxmlformats.org/officeDocument/2006/relationships">
+  <p:cSld>
+    <p:spTree>
+      <p:nvGrpSpPr>
+        <p:cNvPr id="1" name=""/>
+        <p:cNvGrpSpPr/>
+        <p:nvPr/>
+      </p:nvGrpSpPr>
+      <p:grpSpPr>
+        <a:xfrm>
+          <a:off x="0" y="0"/>
+          <a:ext cx="0" cy="0"/>
+          <a:chOff x="0" y="0"/>
+          <a:chExt cx="0" cy="0"/>
+        </a:xfrm>
+      </p:grpSpPr>
+      <p:sp>
+        <p:nvSpPr>
+          <p:cNvPr id="87" name="TextShape 1"/>
+          <p:cNvSpPr txBox="1"/>
+          <p:nvPr/>
+        </p:nvSpPr>
+        <p:spPr>
+          <a:xfrm>
+            <a:off x="576000" y="216000"/>
+            <a:ext cx="8064000" cy="7225560"/>
+          </a:xfrm>
+          <a:prstGeom prst="rect">
+            <a:avLst/>
+          </a:prstGeom>
+        </p:spPr>
+        <p:txBody>
+          <a:bodyPr lIns="90000" rIns="90000" tIns="45000" bIns="45000"/>
+          <a:p>
+            <a:r>
+              <a:rPr lang="es-EC" sz="2400">
+                <a:latin typeface="Colibri"/>
+              </a:rPr>
+              <a:t>10) El Sr. Díaz invirtió $ 2,000 durante un año al 30% con capitalización mensual y desea saber:</a:t>
+            </a:r>
+            <a:endParaRPr/>
+          </a:p>
+          <a:p>
+            <a:pPr>
+              <a:buSzPct val="45000"/>
+              <a:buFont typeface="StarSymbol"/>
+              <a:buChar char=""/>
+            </a:pPr>
+            <a:r>
+              <a:rPr lang="es-EC" sz="2400">
+                <a:latin typeface="Colibri"/>
+              </a:rPr>
+              <a:t>Cuál es el valor futuro de su inversión?</a:t>
+            </a:r>
+            <a:endParaRPr/>
+          </a:p>
+          <a:p>
+            <a:pPr>
+              <a:buSzPct val="45000"/>
+              <a:buFont typeface="StarSymbol"/>
+              <a:buChar char=""/>
+            </a:pPr>
+            <a:r>
+              <a:rPr lang="es-EC" sz="2400">
+                <a:latin typeface="Colibri"/>
+              </a:rPr>
+              <a:t>Los intereses que va a generar su inversión?</a:t>
+            </a:r>
+            <a:endParaRPr/>
+          </a:p>
+          <a:p>
+            <a:pPr>
+              <a:buSzPct val="45000"/>
+              <a:buFont typeface="StarSymbol"/>
+              <a:buChar char=""/>
+            </a:pPr>
+            <a:r>
+              <a:rPr lang="es-EC" sz="2400">
+                <a:latin typeface="Colibri"/>
+              </a:rPr>
+              <a:t>La tasa efectiva anual de su inversión?</a:t>
+            </a:r>
+            <a:endParaRPr/>
+          </a:p>
+          <a:p>
+            <a:pPr>
+              <a:buSzPct val="45000"/>
+              <a:buFont typeface="StarSymbol"/>
+              <a:buChar char=""/>
+            </a:pPr>
+            <a:r>
+              <a:rPr lang="es-EC" sz="2400">
+                <a:latin typeface="Colibri"/>
+              </a:rPr>
+              <a:t>Aplicando la tasa efectiva anual sobre su inversión compruebe el valor futuro?</a:t>
+            </a:r>
+            <a:endParaRPr/>
+          </a:p>
+          <a:p>
+            <a:endParaRPr/>
+          </a:p>
+          <a:p>
+            <a:r>
+              <a:rPr lang="es-EC" sz="2400">
+                <a:latin typeface="Colibri"/>
+              </a:rPr>
+              <a:t>11) Convierte las siguientes tasas efectivas en nominales:</a:t>
+            </a:r>
+            <a:endParaRPr/>
+          </a:p>
+          <a:p>
+            <a:r>
+              <a:rPr lang="es-EC" sz="2400">
+                <a:latin typeface="Colibri"/>
+              </a:rPr>
+              <a:t>2% en 36 días</a:t>
+            </a:r>
+            <a:endParaRPr/>
+          </a:p>
+          <a:p>
+            <a:r>
+              <a:rPr lang="es-EC" sz="2400">
+                <a:latin typeface="Colibri"/>
+              </a:rPr>
+              <a:t>2.5% en 28 días</a:t>
+            </a:r>
+            <a:endParaRPr/>
+          </a:p>
+          <a:p>
+            <a:endParaRPr/>
+          </a:p>
+          <a:p>
+            <a:r>
+              <a:rPr lang="es-EC" sz="2400">
+                <a:latin typeface="Colibri"/>
+              </a:rPr>
+              <a:t>12) Una deuda de $20.000 debe amortizarse con 12 pagos mensuales vencidos. Hallar el valor de estos, a la tasa efectiva del 8% mensual, y elaborar el cuadro de amortización para los dos primeros meses.</a:t>
+            </a:r>
+            <a:endParaRPr/>
+          </a:p>
+          <a:p>
+            <a:endParaRPr/>
+          </a:p>
+          <a:p>
+            <a:endParaRPr/>
+          </a:p>
+        </p:txBody>
+      </p:sp>
+    </p:spTree>
+  </p:cSld>
+  <p:timing>
+    <p:tnLst>
+      <p:par>
+        <p:cTn id="27" dur="indefinite" restart="never" nodeType="tmRoot">
+          <p:childTnLst>
+            <p:seq>
+              <p:cTn id="28" nodeType="mainSeq"/>
               <p:prevCondLst>
                 <p:cond delay="0" evt="onPrev">
                   <p:tgtEl>
@@ -3031,7 +3476,7 @@
         </p:nvSpPr>
         <p:spPr>
           <a:xfrm>
-            <a:off x="396000" y="360000"/>
+            <a:off x="432000" y="360000"/>
             <a:ext cx="8279280" cy="6154560"/>
           </a:xfrm>
           <a:prstGeom prst="rect">
@@ -3049,25 +3494,28 @@
               <a:rPr b="1" lang="es-EC" sz="2400">
                 <a:latin typeface="Colibri"/>
               </a:rPr>
-              <a:t>A</a:t>
-            </a:r>
+              <a:t>AMORTIZ.LIN:</a:t>
+            </a:r>
+            <a:r>
+              <a:rPr lang="es-EC" sz="2400">
+                <a:latin typeface="Colibri"/>
+              </a:rPr>
+              <a:t> Devuelve la amortización de cada uno de los Períodos contables.</a:t>
+            </a:r>
+            <a:endParaRPr/>
+          </a:p>
+          <a:p>
             <a:r>
               <a:rPr b="1" lang="es-EC" sz="2400">
                 <a:latin typeface="Colibri"/>
               </a:rPr>
-              <a:t>MORTIZ.LIN</a:t>
-            </a:r>
-            <a:r>
-              <a:rPr b="1" lang="es-EC" sz="2000">
-                <a:latin typeface="Colibri"/>
-              </a:rPr>
-              <a:t>: </a:t>
-            </a:r>
-            <a:r>
-              <a:rPr lang="es-EC" sz="2000">
-                <a:latin typeface="Colibri"/>
-              </a:rPr>
-              <a:t>Devuelve la amortización de cada uno de los Períodos contables.</a:t>
+              <a:t>AMORTIZ.PROGRE:</a:t>
+            </a:r>
+            <a:r>
+              <a:rPr lang="es-EC" sz="2400">
+                <a:latin typeface="Colibri"/>
+              </a:rPr>
+              <a:t> Devuelve la amortización de cada período Contable mediante el uso de un coeficiente de amortización.</a:t>
             </a:r>
             <a:endParaRPr/>
           </a:p>
@@ -3076,13 +3524,13 @@
               <a:rPr b="1" lang="es-EC" sz="2400">
                 <a:latin typeface="Colibri"/>
               </a:rPr>
-              <a:t>AMORTIZ.PROGRE:</a:t>
-            </a:r>
-            <a:r>
-              <a:rPr lang="es-EC" sz="2400">
-                <a:latin typeface="Colibri"/>
-              </a:rPr>
-              <a:t> Devuelve la amortización progresiva de cada período Contable.</a:t>
+              <a:t>CUPON.DIAS:</a:t>
+            </a:r>
+            <a:r>
+              <a:rPr lang="es-EC" sz="2400">
+                <a:latin typeface="Colibri"/>
+              </a:rPr>
+              <a:t> Devuelve el número de días en el período nominal que contiene la fecha de liquidación.</a:t>
             </a:r>
             <a:endParaRPr/>
           </a:p>
@@ -3091,13 +3539,13 @@
               <a:rPr b="1" lang="es-EC" sz="2400">
                 <a:latin typeface="Colibri"/>
               </a:rPr>
-              <a:t>CUPON.DIAS:</a:t>
-            </a:r>
-            <a:r>
-              <a:rPr lang="es-EC" sz="2400">
-                <a:latin typeface="Colibri"/>
-              </a:rPr>
-              <a:t> Devuelve el número de días en el período nominal(entre 2 cupones) que contiene la fecha de liquidación.</a:t>
+              <a:t>CUPON.DIAS.L1:</a:t>
+            </a:r>
+            <a:r>
+              <a:rPr lang="es-EC" sz="2400">
+                <a:latin typeface="Colibri"/>
+              </a:rPr>
+              <a:t> Devuelve el número de días del inicio del Período nominal hasta la fecha de liquidación.</a:t>
             </a:r>
             <a:endParaRPr/>
           </a:p>
@@ -3106,13 +3554,13 @@
               <a:rPr b="1" lang="es-EC" sz="2400">
                 <a:latin typeface="Colibri"/>
               </a:rPr>
-              <a:t>CUPON.DIAS.L1:</a:t>
-            </a:r>
-            <a:r>
-              <a:rPr lang="es-EC" sz="2400">
-                <a:latin typeface="Colibri"/>
-              </a:rPr>
-              <a:t> Devuelve el número de días del inicio del Período nominal hasta la fecha de liquidación.</a:t>
+              <a:t>CUPON.DIAS.L2:</a:t>
+            </a:r>
+            <a:r>
+              <a:rPr lang="es-EC" sz="2400">
+                <a:latin typeface="Colibri"/>
+              </a:rPr>
+              <a:t> Devuelve el número de días de la fecha de Liquidación hasta la siguiente fecha nominal.</a:t>
             </a:r>
             <a:endParaRPr/>
           </a:p>
@@ -3121,21 +3569,6 @@
               <a:rPr b="1" lang="es-EC" sz="2400">
                 <a:latin typeface="Colibri"/>
               </a:rPr>
-              <a:t>CUPON.DIAS.L2:</a:t>
-            </a:r>
-            <a:r>
-              <a:rPr lang="es-EC" sz="2400">
-                <a:latin typeface="Colibri"/>
-              </a:rPr>
-              <a:t> Devuelve el número de días de la fecha de Liquidación hasta la siguiente fecha nominal.</a:t>
-            </a:r>
-            <a:endParaRPr/>
-          </a:p>
-          <a:p>
-            <a:r>
-              <a:rPr b="1" lang="es-EC" sz="2400">
-                <a:latin typeface="Colibri"/>
-              </a:rPr>
               <a:t>CUPON.FECHA.L1:</a:t>
             </a:r>
             <a:r>
@@ -3143,21 +3576,6 @@
                 <a:latin typeface="Colibri"/>
               </a:rPr>
               <a:t> Devuelve fecha de cupón anterior antes de la fecha de liquidación.</a:t>
-            </a:r>
-            <a:endParaRPr/>
-          </a:p>
-          <a:p>
-            <a:r>
-              <a:rPr b="1" lang="es-EC" sz="2400">
-                <a:latin typeface="Colibri"/>
-              </a:rPr>
-              <a:t>CUPON.FECHA.L2: </a:t>
-            </a:r>
-            <a:r>
-              <a:rPr lang="es-EC" sz="2400">
-                <a:latin typeface="Colibri"/>
-              </a:rPr>
-              <a:t>Devuelve la próxima fecha Nominal después de la fecha de liquidación.</a:t>
             </a:r>
             <a:endParaRPr/>
           </a:p>
@@ -3237,6 +3655,18 @@
         <p:txBody>
           <a:bodyPr lIns="90000" rIns="90000" tIns="45000" bIns="45000"/>
           <a:p>
+            <a:r>
+              <a:rPr b="1" lang="es-EC" sz="2400">
+                <a:latin typeface="Colibri"/>
+              </a:rPr>
+              <a:t>CUPON.FECHA.L2:</a:t>
+            </a:r>
+            <a:r>
+              <a:rPr lang="es-EC" sz="2400">
+                <a:latin typeface="Colibri"/>
+              </a:rPr>
+              <a:t> Devuelve la próxima fecha Nominal después de la fecha de liquidación.</a:t>
+            </a:r>
             <a:endParaRPr/>
           </a:p>
           <a:p>
@@ -3364,7 +3794,7 @@
         </p:nvSpPr>
         <p:spPr>
           <a:xfrm>
-            <a:off x="360000" y="288000"/>
+            <a:off x="360000" y="360000"/>
             <a:ext cx="8495280" cy="5797800"/>
           </a:xfrm>
           <a:prstGeom prst="rect">
@@ -3523,71 +3953,134 @@
       </p:grpSpPr>
       <p:sp>
         <p:nvSpPr>
-          <p:cNvPr id="78" name="TextShape 1"/>
-          <p:cNvSpPr txBox="1"/>
+          <p:cNvPr id="78" name="CustomShape 1"/>
+          <p:cNvSpPr/>
           <p:nvPr/>
         </p:nvSpPr>
         <p:spPr>
           <a:xfrm>
-            <a:off x="288000" y="936000"/>
-            <a:ext cx="8568000" cy="5236560"/>
-          </a:xfrm>
-          <a:prstGeom prst="rect">
-            <a:avLst/>
-          </a:prstGeom>
+            <a:off x="432000" y="720000"/>
+            <a:ext cx="8279280" cy="5441040"/>
+          </a:xfrm>
+          <a:prstGeom prst="rect">
+            <a:avLst/>
+          </a:prstGeom>
+          <a:noFill/>
+          <a:ln>
+            <a:noFill/>
+          </a:ln>
         </p:spPr>
         <p:txBody>
           <a:bodyPr lIns="90000" rIns="90000" tIns="45000" bIns="45000"/>
           <a:p>
             <a:r>
-              <a:rPr lang="es-EC" sz="2400">
-                <a:latin typeface="Arial"/>
-              </a:rPr>
-              <a:t>Por lo general, en todos los casos vas a encontrar la Tasa Nominal Anual (TNA), es decir, el porcentaje que hay que aplicar sobre el monto que pedís en préstamo para determinar cuánto deberás pagar al añoen concepto de intereses si la devolución se hace toda junta. Por ejemplo, $10.000 a una TNA de 18%, implican $1.800 de intereses a pagar al devolver el dinero en un año.</a:t>
-            </a:r>
-            <a:endParaRPr/>
-          </a:p>
-          <a:p>
-            <a:r>
-              <a:rPr lang="es-EC" sz="2400">
-                <a:latin typeface="Arial"/>
-              </a:rPr>
-              <a:t>Ahora bien, en general, los préstamos no se devuelven al año completo sino que se van repagando en cuotas mensuales. Así, el monto adeudado disminuye gradualmente aunque se recarga con intereses sobre el total, que se van capitalizando también cada 30 días, por lo que el impacto financiero de la tasa es mayor. En estos casos, las tasas nominales no resultan las más adecuadas. Así surgen las llamadas "tasas efectivas", que contemplan estas variaciones.</a:t>
-            </a:r>
-            <a:endParaRPr/>
-          </a:p>
-        </p:txBody>
-      </p:sp>
-      <p:sp>
-        <p:nvSpPr>
-          <p:cNvPr id="79" name="TextShape 2"/>
-          <p:cNvSpPr txBox="1"/>
-          <p:nvPr/>
-        </p:nvSpPr>
-        <p:spPr>
-          <a:xfrm>
-            <a:off x="216000" y="72000"/>
-            <a:ext cx="7560000" cy="488160"/>
-          </a:xfrm>
-          <a:prstGeom prst="rect">
-            <a:avLst/>
-          </a:prstGeom>
-        </p:spPr>
-        <p:txBody>
-          <a:bodyPr lIns="90000" rIns="90000" tIns="45000" bIns="45000"/>
-          <a:p>
-            <a:r>
-              <a:rPr lang="es-EC" sz="2800">
-                <a:latin typeface="Arial"/>
-              </a:rPr>
-              <a:t>Diferencia Tasa Interes Nominal y Efectiva</a:t>
-            </a:r>
+              <a:rPr b="1" lang="es-EC" sz="2400">
+                <a:latin typeface="Colibri"/>
+              </a:rPr>
+              <a:t>LETRA.DE.TES.RENDTO:</a:t>
+            </a:r>
+            <a:r>
+              <a:rPr lang="es-EC" sz="2400">
+                <a:latin typeface="Colibri"/>
+              </a:rPr>
+              <a:t> Devuelve el rendimiento de una letra de tesorería.</a:t>
+            </a:r>
+            <a:endParaRPr/>
+          </a:p>
+          <a:p>
+            <a:r>
+              <a:rPr b="1" lang="es-EC" sz="2400">
+                <a:latin typeface="Colibri"/>
+              </a:rPr>
+              <a:t>LETRA.DE.TEST.EQV.A.BONO:</a:t>
+            </a:r>
+            <a:r>
+              <a:rPr lang="es-EC" sz="2400">
+                <a:latin typeface="Colibri"/>
+              </a:rPr>
+              <a:t> Devuelve el Rendimiento para un bono equivalente a una letra de tesorería.</a:t>
+            </a:r>
+            <a:endParaRPr/>
+          </a:p>
+          <a:p>
+            <a:r>
+              <a:rPr b="1" lang="es-EC" sz="2400">
+                <a:latin typeface="Colibri"/>
+              </a:rPr>
+              <a:t>MONEDA.DEC:</a:t>
+            </a:r>
+            <a:r>
+              <a:rPr lang="es-EC" sz="2400">
+                <a:latin typeface="Colibri"/>
+              </a:rPr>
+              <a:t> Convierte un precio en dólar, Expresado como fracción, en un precio en Dólares, Expresado como número decimal. </a:t>
+            </a:r>
+            <a:endParaRPr/>
+          </a:p>
+          <a:p>
+            <a:r>
+              <a:rPr b="1" lang="es-EC" sz="2400">
+                <a:latin typeface="Colibri"/>
+              </a:rPr>
+              <a:t>MONEDA.FRAC:</a:t>
+            </a:r>
+            <a:r>
+              <a:rPr lang="es-EC" sz="2400">
+                <a:latin typeface="Colibri"/>
+              </a:rPr>
+              <a:t> Convierte un precio en dólar, Expresado como número decimal, en un precio en dólares, Expresado como una fracción.</a:t>
+            </a:r>
+            <a:endParaRPr/>
+          </a:p>
+          <a:p>
+            <a:r>
+              <a:rPr b="1" lang="es-EC" sz="2400">
+                <a:latin typeface="Colibri"/>
+              </a:rPr>
+              <a:t>NPER:</a:t>
+            </a:r>
+            <a:r>
+              <a:rPr lang="es-EC" sz="2400">
+                <a:latin typeface="Colibri"/>
+              </a:rPr>
+              <a:t> Devuelve el número de pagos de una Inversión, basado en Pagos constantes y periódicos y una tasa de Interés constante.</a:t>
+            </a:r>
+            <a:endParaRPr/>
+          </a:p>
+          <a:p>
             <a:endParaRPr/>
           </a:p>
         </p:txBody>
       </p:sp>
     </p:spTree>
   </p:cSld>
+  <p:timing>
+    <p:tnLst>
+      <p:par>
+        <p:cTn id="9" dur="indefinite" restart="never" nodeType="tmRoot">
+          <p:childTnLst>
+            <p:seq>
+              <p:cTn id="10" nodeType="mainSeq"/>
+              <p:prevCondLst>
+                <p:cond delay="0" evt="onPrev">
+                  <p:tgtEl>
+                    <p:sldTgt/>
+                  </p:tgtEl>
+                </p:cond>
+              </p:prevCondLst>
+              <p:nextCondLst>
+                <p:cond delay="0" evt="onNext">
+                  <p:tgtEl>
+                    <p:sldTgt/>
+                  </p:tgtEl>
+                </p:cond>
+              </p:nextCondLst>
+            </p:seq>
+          </p:childTnLst>
+        </p:cTn>
+      </p:par>
+    </p:tnLst>
+  </p:timing>
 </p:sld>
 </file>
 
@@ -3610,14 +4103,14 @@
       </p:grpSpPr>
       <p:sp>
         <p:nvSpPr>
-          <p:cNvPr id="80" name="CustomShape 1"/>
+          <p:cNvPr id="79" name="CustomShape 1"/>
           <p:cNvSpPr/>
           <p:nvPr/>
         </p:nvSpPr>
         <p:spPr>
           <a:xfrm>
-            <a:off x="432000" y="720000"/>
-            <a:ext cx="8279280" cy="5441040"/>
+            <a:off x="360000" y="360000"/>
+            <a:ext cx="8351280" cy="6154560"/>
           </a:xfrm>
           <a:prstGeom prst="rect">
             <a:avLst/>
@@ -3634,13 +4127,13 @@
               <a:rPr b="1" lang="es-EC" sz="2400">
                 <a:latin typeface="Colibri"/>
               </a:rPr>
-              <a:t>LETRA.DE.TES.RENDTO:</a:t>
-            </a:r>
-            <a:r>
-              <a:rPr lang="es-EC" sz="2400">
-                <a:latin typeface="Colibri"/>
-              </a:rPr>
-              <a:t> Devuelve el rendimiento de una letra de tesorería.</a:t>
+              <a:t>PAGO:</a:t>
+            </a:r>
+            <a:r>
+              <a:rPr lang="es-EC" sz="2400">
+                <a:latin typeface="Colibri"/>
+              </a:rPr>
+              <a:t> Calcula el pago de un préstamo basado en pagos y tasa de Interés constantes.</a:t>
             </a:r>
             <a:endParaRPr/>
           </a:p>
@@ -3649,13 +4142,13 @@
               <a:rPr b="1" lang="es-EC" sz="2400">
                 <a:latin typeface="Colibri"/>
               </a:rPr>
-              <a:t>LETRA.DE.TEST.EQV.A.BONO:</a:t>
-            </a:r>
-            <a:r>
-              <a:rPr lang="es-EC" sz="2400">
-                <a:latin typeface="Colibri"/>
-              </a:rPr>
-              <a:t> Devuelve el Rendimiento para un bono equivalente a una letra de tesorería.</a:t>
+              <a:t>PAGO.INT.ENTRE:</a:t>
+            </a:r>
+            <a:r>
+              <a:rPr lang="es-EC" sz="2400">
+                <a:latin typeface="Colibri"/>
+              </a:rPr>
+              <a:t> Devuelve el pago de Intereses Acumulativo entre dos períodos.</a:t>
             </a:r>
             <a:endParaRPr/>
           </a:p>
@@ -3664,13 +4157,13 @@
               <a:rPr b="1" lang="es-EC" sz="2400">
                 <a:latin typeface="Colibri"/>
               </a:rPr>
-              <a:t>MONEDA.DEC:</a:t>
-            </a:r>
-            <a:r>
-              <a:rPr lang="es-EC" sz="2400">
-                <a:latin typeface="Colibri"/>
-              </a:rPr>
-              <a:t> Convierte un precio en dólar, Expresado como fracción, en un precio en Dólares, Expresado como número decimal. </a:t>
+              <a:t>PAGO.PRINC.ENTRE:</a:t>
+            </a:r>
+            <a:r>
+              <a:rPr lang="es-EC" sz="2400">
+                <a:latin typeface="Colibri"/>
+              </a:rPr>
+              <a:t> Devuelve el pago principal acumulativo de un préstamo entre dos períodos.</a:t>
             </a:r>
             <a:endParaRPr/>
           </a:p>
@@ -3679,13 +4172,13 @@
               <a:rPr b="1" lang="es-EC" sz="2400">
                 <a:latin typeface="Colibri"/>
               </a:rPr>
-              <a:t>MONEDA.FRAC:</a:t>
-            </a:r>
-            <a:r>
-              <a:rPr lang="es-EC" sz="2400">
-                <a:latin typeface="Colibri"/>
-              </a:rPr>
-              <a:t> Convierte un precio en dólar, Expresado como número decimal, en un precio en dólares, Expresado como una fracción.</a:t>
+              <a:t>PAGOINT:</a:t>
+            </a:r>
+            <a:r>
+              <a:rPr lang="es-EC" sz="2400">
+                <a:latin typeface="Colibri"/>
+              </a:rPr>
+              <a:t> Devuelve el interés pagado por una Inversión durante un Período determinado, basado en Pagos periódicos y constantes y una tasa de Interés constante.</a:t>
             </a:r>
             <a:endParaRPr/>
           </a:p>
@@ -3694,13 +4187,28 @@
               <a:rPr b="1" lang="es-EC" sz="2400">
                 <a:latin typeface="Colibri"/>
               </a:rPr>
-              <a:t>NPER:</a:t>
-            </a:r>
-            <a:r>
-              <a:rPr lang="es-EC" sz="2400">
-                <a:latin typeface="Colibri"/>
-              </a:rPr>
-              <a:t> Devuelve el número de pagos de una Inversión, basado en Pagos constantes y periódicos y una tasa de Interés constante.</a:t>
+              <a:t>PAGOPRIN:</a:t>
+            </a:r>
+            <a:r>
+              <a:rPr lang="es-EC" sz="2400">
+                <a:latin typeface="Colibri"/>
+              </a:rPr>
+              <a:t> Devuelve el pago del capital de una Inversión Determinada, basado en Pagos constantes y periódicos, y una tasa de Interés constante.</a:t>
+            </a:r>
+            <a:endParaRPr/>
+          </a:p>
+          <a:p>
+            <a:r>
+              <a:rPr b="1" lang="es-EC" sz="2400">
+                <a:latin typeface="Colibri"/>
+              </a:rPr>
+              <a:t>PRECIO:</a:t>
+            </a:r>
+            <a:r>
+              <a:rPr lang="es-EC" sz="2400">
+                <a:latin typeface="Colibri"/>
+              </a:rPr>
+              <a:t> Devuelve el precio por 100$ de valor nominal de un valor bursátil que paga una tasa de interés periódica.</a:t>
             </a:r>
             <a:endParaRPr/>
           </a:p>
@@ -3714,10 +4222,10 @@
   <p:timing>
     <p:tnLst>
       <p:par>
-        <p:cTn id="9" dur="indefinite" restart="never" nodeType="tmRoot">
+        <p:cTn id="11" dur="indefinite" restart="never" nodeType="tmRoot">
           <p:childTnLst>
             <p:seq>
-              <p:cTn id="10" nodeType="mainSeq"/>
+              <p:cTn id="12" nodeType="mainSeq"/>
               <p:prevCondLst>
                 <p:cond delay="0" evt="onPrev">
                   <p:tgtEl>
@@ -3760,14 +4268,14 @@
       </p:grpSpPr>
       <p:sp>
         <p:nvSpPr>
-          <p:cNvPr id="81" name="CustomShape 1"/>
+          <p:cNvPr id="80" name="CustomShape 1"/>
           <p:cNvSpPr/>
           <p:nvPr/>
         </p:nvSpPr>
         <p:spPr>
           <a:xfrm>
             <a:off x="360000" y="360000"/>
-            <a:ext cx="8351280" cy="6154560"/>
+            <a:ext cx="8423280" cy="3300480"/>
           </a:xfrm>
           <a:prstGeom prst="rect">
             <a:avLst/>
@@ -3784,13 +4292,13 @@
               <a:rPr b="1" lang="es-EC" sz="2400">
                 <a:latin typeface="Colibri"/>
               </a:rPr>
-              <a:t>PAGO:</a:t>
-            </a:r>
-            <a:r>
-              <a:rPr lang="es-EC" sz="2400">
-                <a:latin typeface="Colibri"/>
-              </a:rPr>
-              <a:t> Calcula el pago de un préstamo basado en pagos y tasa de Interés constantes.</a:t>
+              <a:t>PRECIO.DESCUENTO:</a:t>
+            </a:r>
+            <a:r>
+              <a:rPr lang="es-EC" sz="2400">
+                <a:latin typeface="Colibri"/>
+              </a:rPr>
+              <a:t> Devuelve el precio por 100$ de un valor nominal de un valor bursátil con descuento.</a:t>
             </a:r>
             <a:endParaRPr/>
           </a:p>
@@ -3799,13 +4307,13 @@
               <a:rPr b="1" lang="es-EC" sz="2400">
                 <a:latin typeface="Colibri"/>
               </a:rPr>
-              <a:t>PAGO.INT.ENTRE:</a:t>
-            </a:r>
-            <a:r>
-              <a:rPr lang="es-EC" sz="2400">
-                <a:latin typeface="Colibri"/>
-              </a:rPr>
-              <a:t> Devuelve el pago de Intereses Acumulativo entre dos períodos.</a:t>
+              <a:t>PRECIO.VENCIMIENTO:</a:t>
+            </a:r>
+            <a:r>
+              <a:rPr lang="es-EC" sz="2400">
+                <a:latin typeface="Colibri"/>
+              </a:rPr>
+              <a:t> Devuelve el precio por 100$ de un valor nominal que Genera intereses al vencimiento.</a:t>
             </a:r>
             <a:endParaRPr/>
           </a:p>
@@ -3814,13 +4322,13 @@
               <a:rPr b="1" lang="es-EC" sz="2400">
                 <a:latin typeface="Colibri"/>
               </a:rPr>
-              <a:t>PAGO.PRINC.ENTRE:</a:t>
-            </a:r>
-            <a:r>
-              <a:rPr lang="es-EC" sz="2400">
-                <a:latin typeface="Colibri"/>
-              </a:rPr>
-              <a:t> Devuelve el pago principal acumulativo de un préstamo entre dos períodos.</a:t>
+              <a:t>RENDTO: </a:t>
+            </a:r>
+            <a:r>
+              <a:rPr lang="es-EC" sz="2400">
+                <a:latin typeface="Colibri"/>
+              </a:rPr>
+              <a:t>Devuelve el rendimiento de un valor bursátil que Obtiene Intereses periódicos.</a:t>
             </a:r>
             <a:endParaRPr/>
           </a:p>
@@ -3829,13 +4337,13 @@
               <a:rPr b="1" lang="es-EC" sz="2400">
                 <a:latin typeface="Colibri"/>
               </a:rPr>
-              <a:t>PAGOINT:</a:t>
-            </a:r>
-            <a:r>
-              <a:rPr lang="es-EC" sz="2400">
-                <a:latin typeface="Colibri"/>
-              </a:rPr>
-              <a:t> Devuelve el interés pagado por una Inversión durante un Período determinado, basado en Pagos periódicos y constantes y una tasa de Interés constante.</a:t>
+              <a:t>RENDTO.DESC:</a:t>
+            </a:r>
+            <a:r>
+              <a:rPr lang="es-EC" sz="2400">
+                <a:latin typeface="Colibri"/>
+              </a:rPr>
+              <a:t> Devuelve el Rendimiento anual para el valor bursátil con descuento.</a:t>
             </a:r>
             <a:endParaRPr/>
           </a:p>
@@ -3844,13 +4352,13 @@
               <a:rPr b="1" lang="es-EC" sz="2400">
                 <a:latin typeface="Colibri"/>
               </a:rPr>
-              <a:t>PAGOPRIN:</a:t>
-            </a:r>
-            <a:r>
-              <a:rPr lang="es-EC" sz="2400">
-                <a:latin typeface="Colibri"/>
-              </a:rPr>
-              <a:t> Devuelve el pago del capital de una Inversión Determinada, basado en Pagos constantes y periódicos, y una tasa de Interés constante.</a:t>
+              <a:t>RENDTO.VENCTO:</a:t>
+            </a:r>
+            <a:r>
+              <a:rPr lang="es-EC" sz="2400">
+                <a:latin typeface="Colibri"/>
+              </a:rPr>
+              <a:t> Devuelve el interés anual de un valor que Genera intereses al vencimiento.</a:t>
             </a:r>
             <a:endParaRPr/>
           </a:p>
@@ -3859,17 +4367,29 @@
               <a:rPr b="1" lang="es-EC" sz="2400">
                 <a:latin typeface="Colibri"/>
               </a:rPr>
-              <a:t>PRECIO:</a:t>
-            </a:r>
-            <a:r>
-              <a:rPr lang="es-EC" sz="2400">
-                <a:latin typeface="Colibri"/>
-              </a:rPr>
-              <a:t> Devuelve el precio por 100$ de valor nominal de un valor bursátil que paga una tasa de interés periódica.</a:t>
-            </a:r>
-            <a:endParaRPr/>
-          </a:p>
-          <a:p>
+              <a:t>SLN:</a:t>
+            </a:r>
+            <a:r>
+              <a:rPr lang="es-EC" sz="2400">
+                <a:latin typeface="Colibri"/>
+              </a:rPr>
+              <a:t> Devuelve la Depreciación por método directo de un activo en un período dado.</a:t>
+            </a:r>
+            <a:endParaRPr/>
+          </a:p>
+          <a:p>
+            <a:r>
+              <a:rPr b="1" lang="es-EC" sz="2400">
+                <a:latin typeface="Colibri"/>
+              </a:rPr>
+              <a:t>SYD:</a:t>
+            </a:r>
+            <a:r>
+              <a:rPr lang="es-EC" sz="2400">
+                <a:latin typeface="Colibri"/>
+              </a:rPr>
+              <a:t> Devuelve la Depreciación por método de anualidades de un activo durante un Período específico.</a:t>
+            </a:r>
             <a:endParaRPr/>
           </a:p>
         </p:txBody>
@@ -3879,10 +4399,10 @@
   <p:timing>
     <p:tnLst>
       <p:par>
-        <p:cTn id="11" dur="indefinite" restart="never" nodeType="tmRoot">
+        <p:cTn id="13" dur="indefinite" restart="never" nodeType="tmRoot">
           <p:childTnLst>
             <p:seq>
-              <p:cTn id="12" nodeType="mainSeq"/>
+              <p:cTn id="14" nodeType="mainSeq"/>
               <p:prevCondLst>
                 <p:cond delay="0" evt="onPrev">
                   <p:tgtEl>
@@ -3925,14 +4445,14 @@
       </p:grpSpPr>
       <p:sp>
         <p:nvSpPr>
-          <p:cNvPr id="82" name="CustomShape 1"/>
+          <p:cNvPr id="81" name="CustomShape 1"/>
           <p:cNvSpPr/>
           <p:nvPr/>
         </p:nvSpPr>
         <p:spPr>
           <a:xfrm>
-            <a:off x="360000" y="360000"/>
-            <a:ext cx="8423280" cy="3300480"/>
+            <a:off x="216000" y="288000"/>
+            <a:ext cx="8783640" cy="6154920"/>
           </a:xfrm>
           <a:prstGeom prst="rect">
             <a:avLst/>
@@ -3949,13 +4469,13 @@
               <a:rPr b="1" lang="es-EC" sz="2400">
                 <a:latin typeface="Colibri"/>
               </a:rPr>
-              <a:t>PRECIO.DESCUENTO:</a:t>
-            </a:r>
-            <a:r>
-              <a:rPr lang="es-EC" sz="2400">
-                <a:latin typeface="Colibri"/>
-              </a:rPr>
-              <a:t> Devuelve el precio por 100$ de un valor nominal de un valor bursátil con descuento.</a:t>
+              <a:t>TASA:</a:t>
+            </a:r>
+            <a:r>
+              <a:rPr lang="es-EC" sz="2400">
+                <a:latin typeface="Colibri"/>
+              </a:rPr>
+              <a:t> Devuelve la tasa de interés por período de un préstamo o una inversión.</a:t>
             </a:r>
             <a:endParaRPr/>
           </a:p>
@@ -3964,13 +4484,13 @@
               <a:rPr b="1" lang="es-EC" sz="2400">
                 <a:latin typeface="Colibri"/>
               </a:rPr>
-              <a:t>PRECIO.VENCIMIENTO:</a:t>
-            </a:r>
-            <a:r>
-              <a:rPr lang="es-EC" sz="2400">
-                <a:latin typeface="Colibri"/>
-              </a:rPr>
-              <a:t> Devuelve el precio por 100$ de un valor nominal que Genera intereses al vencimiento.</a:t>
+              <a:t>TASA.DESC:</a:t>
+            </a:r>
+            <a:r>
+              <a:rPr lang="es-EC" sz="2400">
+                <a:latin typeface="Colibri"/>
+              </a:rPr>
+              <a:t> Devuelve la tasa de descuento del valor bursátil.</a:t>
             </a:r>
             <a:endParaRPr/>
           </a:p>
@@ -3979,13 +4499,13 @@
               <a:rPr b="1" lang="es-EC" sz="2400">
                 <a:latin typeface="Colibri"/>
               </a:rPr>
-              <a:t>RENDTO: </a:t>
-            </a:r>
-            <a:r>
-              <a:rPr lang="es-EC" sz="2400">
-                <a:latin typeface="Colibri"/>
-              </a:rPr>
-              <a:t>Devuelve el rendimiento de un valor bursátil que Obtiene Intereses periódicos.</a:t>
+              <a:t>TASA.INT:</a:t>
+            </a:r>
+            <a:r>
+              <a:rPr lang="es-EC" sz="2400">
+                <a:latin typeface="Colibri"/>
+              </a:rPr>
+              <a:t> Devuelve la tasa de interés para la inversión total en un valor bursátil.</a:t>
             </a:r>
             <a:endParaRPr/>
           </a:p>
@@ -3994,13 +4514,13 @@
               <a:rPr b="1" lang="es-EC" sz="2400">
                 <a:latin typeface="Colibri"/>
               </a:rPr>
-              <a:t>RENDTO.DESC:</a:t>
-            </a:r>
-            <a:r>
-              <a:rPr lang="es-EC" sz="2400">
-                <a:latin typeface="Colibri"/>
-              </a:rPr>
-              <a:t> Devuelve el Rendimiento anual para el valor bursátil con descuento.</a:t>
+              <a:t>TASA.NOMINAL:</a:t>
+            </a:r>
+            <a:r>
+              <a:rPr lang="es-EC" sz="2400">
+                <a:latin typeface="Colibri"/>
+              </a:rPr>
+              <a:t> Devuelve la tasa de interés nominal anual.</a:t>
             </a:r>
             <a:endParaRPr/>
           </a:p>
@@ -4009,13 +4529,13 @@
               <a:rPr b="1" lang="es-EC" sz="2400">
                 <a:latin typeface="Colibri"/>
               </a:rPr>
-              <a:t>RENDTO.VENCTO:</a:t>
-            </a:r>
-            <a:r>
-              <a:rPr lang="es-EC" sz="2400">
-                <a:latin typeface="Colibri"/>
-              </a:rPr>
-              <a:t> Devuelve el interés anual de un valor que Genera intereses al vencimiento.</a:t>
+              <a:t>TIR:</a:t>
+            </a:r>
+            <a:r>
+              <a:rPr lang="es-EC" sz="2400">
+                <a:latin typeface="Colibri"/>
+              </a:rPr>
+              <a:t> Devuelve la tasa interna de retorno de una inversión para una serie de valores en efectivo.</a:t>
             </a:r>
             <a:endParaRPr/>
           </a:p>
@@ -4024,13 +4544,13 @@
               <a:rPr b="1" lang="es-EC" sz="2400">
                 <a:latin typeface="Colibri"/>
               </a:rPr>
-              <a:t>SLN:</a:t>
-            </a:r>
-            <a:r>
-              <a:rPr lang="es-EC" sz="2400">
-                <a:latin typeface="Colibri"/>
-              </a:rPr>
-              <a:t> Devuelve la Depreciación por método directo de un activo en un período dado.</a:t>
+              <a:t>TIR.NO.PER:</a:t>
+            </a:r>
+            <a:r>
+              <a:rPr lang="es-EC" sz="2400">
+                <a:latin typeface="Colibri"/>
+              </a:rPr>
+              <a:t> Devuelve la tasa interna de retorno para un flujo de caja que no es Necesariamente periódico.</a:t>
             </a:r>
             <a:endParaRPr/>
           </a:p>
@@ -4039,14 +4559,17 @@
               <a:rPr b="1" lang="es-EC" sz="2400">
                 <a:latin typeface="Colibri"/>
               </a:rPr>
-              <a:t>SYD:</a:t>
-            </a:r>
-            <a:r>
-              <a:rPr lang="es-EC" sz="2400">
-                <a:latin typeface="Colibri"/>
-              </a:rPr>
-              <a:t> Devuelve la Depreciación por método de anualidades de un activo durante un Período específico.</a:t>
-            </a:r>
+              <a:t>TIRM:</a:t>
+            </a:r>
+            <a:r>
+              <a:rPr lang="es-EC" sz="2400">
+                <a:latin typeface="Colibri"/>
+              </a:rPr>
+              <a:t> Devuelve la tasa interna de retorno para una serie de flujos de Efectivo Periódicos, Considerando costo de la inversión e interés al volver a invertir el efectivo.</a:t>
+            </a:r>
+            <a:endParaRPr/>
+          </a:p>
+          <a:p>
             <a:endParaRPr/>
           </a:p>
         </p:txBody>
@@ -4056,10 +4579,10 @@
   <p:timing>
     <p:tnLst>
       <p:par>
-        <p:cTn id="13" dur="indefinite" restart="never" nodeType="tmRoot">
+        <p:cTn id="15" dur="indefinite" restart="never" nodeType="tmRoot">
           <p:childTnLst>
             <p:seq>
-              <p:cTn id="14" nodeType="mainSeq"/>
+              <p:cTn id="16" nodeType="mainSeq"/>
               <p:prevCondLst>
                 <p:cond delay="0" evt="onPrev">
                   <p:tgtEl>
@@ -4102,14 +4625,14 @@
       </p:grpSpPr>
       <p:sp>
         <p:nvSpPr>
-          <p:cNvPr id="83" name="CustomShape 1"/>
+          <p:cNvPr id="82" name="CustomShape 1"/>
           <p:cNvSpPr/>
           <p:nvPr/>
         </p:nvSpPr>
         <p:spPr>
           <a:xfrm>
-            <a:off x="216000" y="288000"/>
-            <a:ext cx="8783640" cy="6154920"/>
+            <a:off x="360000" y="432000"/>
+            <a:ext cx="8351640" cy="5441400"/>
           </a:xfrm>
           <a:prstGeom prst="rect">
             <a:avLst/>
@@ -4126,13 +4649,13 @@
               <a:rPr b="1" lang="es-EC" sz="2400">
                 <a:latin typeface="Colibri"/>
               </a:rPr>
-              <a:t>TASA:</a:t>
-            </a:r>
-            <a:r>
-              <a:rPr lang="es-EC" sz="2400">
-                <a:latin typeface="Colibri"/>
-              </a:rPr>
-              <a:t> Devuelve la tasa de interés por período de un préstamo o una inversión.</a:t>
+              <a:t>VA:</a:t>
+            </a:r>
+            <a:r>
+              <a:rPr lang="es-EC" sz="2400">
+                <a:latin typeface="Colibri"/>
+              </a:rPr>
+              <a:t> Devuelve el valor presente de una inversión: la suma total del valor actual de una serie de pagos futuros.</a:t>
             </a:r>
             <a:endParaRPr/>
           </a:p>
@@ -4141,13 +4664,13 @@
               <a:rPr b="1" lang="es-EC" sz="2400">
                 <a:latin typeface="Colibri"/>
               </a:rPr>
-              <a:t>TASA.DESC:</a:t>
-            </a:r>
-            <a:r>
-              <a:rPr lang="es-EC" sz="2400">
-                <a:latin typeface="Colibri"/>
-              </a:rPr>
-              <a:t> Devuelve la tasa de descuento del valor bursátil.</a:t>
+              <a:t>VF:</a:t>
+            </a:r>
+            <a:r>
+              <a:rPr lang="es-EC" sz="2400">
+                <a:latin typeface="Colibri"/>
+              </a:rPr>
+              <a:t> Devuelve el valor futuro de una inversión basado en Pagos periódicos y constantes, y una tasa de interés también constante.</a:t>
             </a:r>
             <a:endParaRPr/>
           </a:p>
@@ -4156,13 +4679,13 @@
               <a:rPr b="1" lang="es-EC" sz="2400">
                 <a:latin typeface="Colibri"/>
               </a:rPr>
-              <a:t>TASA.INT:</a:t>
-            </a:r>
-            <a:r>
-              <a:rPr lang="es-EC" sz="2400">
-                <a:latin typeface="Colibri"/>
-              </a:rPr>
-              <a:t> Devuelve la tasa de interés para la inversión total en un valor bursátil.</a:t>
+              <a:t>VF.PLAN:</a:t>
+            </a:r>
+            <a:r>
+              <a:rPr lang="es-EC" sz="2400">
+                <a:latin typeface="Colibri"/>
+              </a:rPr>
+              <a:t> Devuelve el valor futuro de una inversión inicial después de aplicar una serie de tasas de interés compuesto. </a:t>
             </a:r>
             <a:endParaRPr/>
           </a:p>
@@ -4171,13 +4694,13 @@
               <a:rPr b="1" lang="es-EC" sz="2400">
                 <a:latin typeface="Colibri"/>
               </a:rPr>
-              <a:t>TASA.NOMINAL:</a:t>
-            </a:r>
-            <a:r>
-              <a:rPr lang="es-EC" sz="2400">
-                <a:latin typeface="Colibri"/>
-              </a:rPr>
-              <a:t> Devuelve la tasa de interés nominal anual.</a:t>
+              <a:t>VNA:</a:t>
+            </a:r>
+            <a:r>
+              <a:rPr lang="es-EC" sz="2400">
+                <a:latin typeface="Colibri"/>
+              </a:rPr>
+              <a:t> Devuelve el valor neto actual de una inversión  partir de una tasa de descuento y una serie de pagos futuros (valores negativos) y Entradas (valores positivos).</a:t>
             </a:r>
             <a:endParaRPr/>
           </a:p>
@@ -4186,47 +4709,14 @@
               <a:rPr b="1" lang="es-EC" sz="2400">
                 <a:latin typeface="Colibri"/>
               </a:rPr>
-              <a:t>TIR:</a:t>
-            </a:r>
-            <a:r>
-              <a:rPr lang="es-EC" sz="2400">
-                <a:latin typeface="Colibri"/>
-              </a:rPr>
-              <a:t> Devuelve la tasa interna de retorno de una inversión para una serie de valores en efectivo.</a:t>
-            </a:r>
-            <a:endParaRPr/>
-          </a:p>
-          <a:p>
-            <a:r>
-              <a:rPr b="1" lang="es-EC" sz="2400">
-                <a:latin typeface="Colibri"/>
-              </a:rPr>
-              <a:t>TIR.NO.PER:</a:t>
-            </a:r>
-            <a:r>
-              <a:rPr lang="es-EC" sz="2400">
-                <a:latin typeface="Colibri"/>
-              </a:rPr>
-              <a:t> Devuelve la tasa interna de retorno para un flujo de caja que no es Necesariamente periódico.</a:t>
-            </a:r>
-            <a:endParaRPr/>
-          </a:p>
-          <a:p>
-            <a:r>
-              <a:rPr b="1" lang="es-EC" sz="2400">
-                <a:latin typeface="Colibri"/>
-              </a:rPr>
-              <a:t>TIRM:</a:t>
-            </a:r>
-            <a:r>
-              <a:rPr lang="es-EC" sz="2400">
-                <a:latin typeface="Colibri"/>
-              </a:rPr>
-              <a:t> Devuelve la tasa interna de retorno para una serie de flujos de Efectivo Periódicos, Considerando costo de la inversión e interés al volver a invertir el efectivo.</a:t>
-            </a:r>
-            <a:endParaRPr/>
-          </a:p>
-          <a:p>
+              <a:t>VNA.NO.PER:</a:t>
+            </a:r>
+            <a:r>
+              <a:rPr lang="es-EC" sz="2400">
+                <a:latin typeface="Colibri"/>
+              </a:rPr>
+              <a:t> Devuelve el valor neto actual para un flujo de caja que no es Necesariamente periódico.</a:t>
+            </a:r>
             <a:endParaRPr/>
           </a:p>
         </p:txBody>
@@ -4236,10 +4726,10 @@
   <p:timing>
     <p:tnLst>
       <p:par>
-        <p:cTn id="15" dur="indefinite" restart="never" nodeType="tmRoot">
+        <p:cTn id="17" dur="indefinite" restart="never" nodeType="tmRoot">
           <p:childTnLst>
             <p:seq>
-              <p:cTn id="16" nodeType="mainSeq"/>
+              <p:cTn id="18" nodeType="mainSeq"/>
               <p:prevCondLst>
                 <p:cond delay="0" evt="onPrev">
                   <p:tgtEl>

</xml_diff>